<commit_message>
Update histogram plots for DaysReg: normalize unlabeled data and adjust labels
</commit_message>
<xml_diff>
--- a/Slides.pptx
+++ b/Slides.pptx
@@ -11,8 +11,8 @@
     <p:sldId id="256" r:id="rId2"/>
     <p:sldId id="257" r:id="rId3"/>
     <p:sldId id="259" r:id="rId4"/>
-    <p:sldId id="258" r:id="rId5"/>
-    <p:sldId id="260" r:id="rId6"/>
+    <p:sldId id="260" r:id="rId5"/>
+    <p:sldId id="258" r:id="rId6"/>
     <p:sldId id="264" r:id="rId7"/>
     <p:sldId id="261" r:id="rId8"/>
     <p:sldId id="265" r:id="rId9"/>
@@ -137,7 +137,7 @@
 <file path=ppt/revisionInfo.xml><?xml version="1.0" encoding="utf-8"?>
 <p1510:revInfo xmlns:a="http://schemas.openxmlformats.org/drawingml/2006/main" xmlns:r="http://schemas.openxmlformats.org/officeDocument/2006/relationships" xmlns:p1510="http://schemas.microsoft.com/office/powerpoint/2015/10/main">
   <p1510:revLst>
-    <p1510:client id="{791D3311-16D3-4E4A-BD16-534F49491870}" v="120" dt="2025-09-14T12:45:27.878"/>
+    <p1510:client id="{791D3311-16D3-4E4A-BD16-534F49491870}" v="142" dt="2025-09-15T12:33:40.742"/>
   </p1510:revLst>
 </p1510:revInfo>
 </file>
@@ -147,7 +147,7 @@
   <pc:docChgLst>
     <pc:chgData name="Mariia Timofeeva" userId="ed2f9b69-3ae3-4a8a-85d4-5441ebde9499" providerId="ADAL" clId="{791D3311-16D3-4E4A-BD16-534F49491870}"/>
     <pc:docChg chg="undo redo custSel addSld delSld modSld sldOrd modMainMaster">
-      <pc:chgData name="Mariia Timofeeva" userId="ed2f9b69-3ae3-4a8a-85d4-5441ebde9499" providerId="ADAL" clId="{791D3311-16D3-4E4A-BD16-534F49491870}" dt="2025-09-14T12:53:10.132" v="1820" actId="1076"/>
+      <pc:chgData name="Mariia Timofeeva" userId="ed2f9b69-3ae3-4a8a-85d4-5441ebde9499" providerId="ADAL" clId="{791D3311-16D3-4E4A-BD16-534F49491870}" dt="2025-09-15T12:33:49.739" v="2108" actId="14100"/>
       <pc:docMkLst>
         <pc:docMk/>
       </pc:docMkLst>
@@ -157,60 +157,12 @@
           <pc:docMk/>
           <pc:sldMk cId="3492267784" sldId="256"/>
         </pc:sldMkLst>
-        <pc:spChg chg="del">
-          <ac:chgData name="Mariia Timofeeva" userId="ed2f9b69-3ae3-4a8a-85d4-5441ebde9499" providerId="ADAL" clId="{791D3311-16D3-4E4A-BD16-534F49491870}" dt="2025-09-13T22:32:35.242" v="1" actId="478"/>
-          <ac:spMkLst>
-            <pc:docMk/>
-            <pc:sldMk cId="3492267784" sldId="256"/>
-            <ac:spMk id="2" creationId="{AD9E34CA-4C8C-4CD9-E348-04C168F441E7}"/>
-          </ac:spMkLst>
-        </pc:spChg>
-        <pc:spChg chg="del">
-          <ac:chgData name="Mariia Timofeeva" userId="ed2f9b69-3ae3-4a8a-85d4-5441ebde9499" providerId="ADAL" clId="{791D3311-16D3-4E4A-BD16-534F49491870}" dt="2025-09-13T22:32:35.242" v="1" actId="478"/>
-          <ac:spMkLst>
-            <pc:docMk/>
-            <pc:sldMk cId="3492267784" sldId="256"/>
-            <ac:spMk id="3" creationId="{B26F36F8-78A9-56C7-48BD-1E1E008BB970}"/>
-          </ac:spMkLst>
-        </pc:spChg>
-        <pc:spChg chg="add del">
-          <ac:chgData name="Mariia Timofeeva" userId="ed2f9b69-3ae3-4a8a-85d4-5441ebde9499" providerId="ADAL" clId="{791D3311-16D3-4E4A-BD16-534F49491870}" dt="2025-09-13T22:32:38.660" v="3" actId="22"/>
-          <ac:spMkLst>
-            <pc:docMk/>
-            <pc:sldMk cId="3492267784" sldId="256"/>
-            <ac:spMk id="5" creationId="{10C3B021-EC8E-FECE-5200-CEE037E1E4FA}"/>
-          </ac:spMkLst>
-        </pc:spChg>
-        <pc:spChg chg="add del">
-          <ac:chgData name="Mariia Timofeeva" userId="ed2f9b69-3ae3-4a8a-85d4-5441ebde9499" providerId="ADAL" clId="{791D3311-16D3-4E4A-BD16-534F49491870}" dt="2025-09-13T22:32:44.253" v="5" actId="22"/>
-          <ac:spMkLst>
-            <pc:docMk/>
-            <pc:sldMk cId="3492267784" sldId="256"/>
-            <ac:spMk id="7" creationId="{C922C4C6-76FD-FA32-A902-B657DC2226E2}"/>
-          </ac:spMkLst>
-        </pc:spChg>
-        <pc:spChg chg="add del mod">
-          <ac:chgData name="Mariia Timofeeva" userId="ed2f9b69-3ae3-4a8a-85d4-5441ebde9499" providerId="ADAL" clId="{791D3311-16D3-4E4A-BD16-534F49491870}" dt="2025-09-13T22:33:30.325" v="13" actId="478"/>
-          <ac:spMkLst>
-            <pc:docMk/>
-            <pc:sldMk cId="3492267784" sldId="256"/>
-            <ac:spMk id="9" creationId="{45A60AA6-B591-3E0D-FF01-71F2846438C2}"/>
-          </ac:spMkLst>
-        </pc:spChg>
         <pc:spChg chg="add mod">
           <ac:chgData name="Mariia Timofeeva" userId="ed2f9b69-3ae3-4a8a-85d4-5441ebde9499" providerId="ADAL" clId="{791D3311-16D3-4E4A-BD16-534F49491870}" dt="2025-09-13T22:53:51.335" v="145" actId="1076"/>
           <ac:spMkLst>
             <pc:docMk/>
             <pc:sldMk cId="3492267784" sldId="256"/>
             <ac:spMk id="11" creationId="{104780F1-3574-E8B5-7B3B-F3E383B87D59}"/>
-          </ac:spMkLst>
-        </pc:spChg>
-        <pc:spChg chg="add del mod">
-          <ac:chgData name="Mariia Timofeeva" userId="ed2f9b69-3ae3-4a8a-85d4-5441ebde9499" providerId="ADAL" clId="{791D3311-16D3-4E4A-BD16-534F49491870}" dt="2025-09-13T22:35:48.682" v="24" actId="21"/>
-          <ac:spMkLst>
-            <pc:docMk/>
-            <pc:sldMk cId="3492267784" sldId="256"/>
-            <ac:spMk id="12" creationId="{42E69088-41F7-DC69-77BC-F382FAC7287A}"/>
           </ac:spMkLst>
         </pc:spChg>
         <pc:spChg chg="add mod">
@@ -227,22 +179,6 @@
             <pc:docMk/>
             <pc:sldMk cId="3492267784" sldId="256"/>
             <ac:spMk id="14" creationId="{A9D8B933-EDB4-28C9-6C8E-59CC6C2C8727}"/>
-          </ac:spMkLst>
-        </pc:spChg>
-        <pc:spChg chg="add del mod">
-          <ac:chgData name="Mariia Timofeeva" userId="ed2f9b69-3ae3-4a8a-85d4-5441ebde9499" providerId="ADAL" clId="{791D3311-16D3-4E4A-BD16-534F49491870}" dt="2025-09-13T22:37:02.784" v="52" actId="478"/>
-          <ac:spMkLst>
-            <pc:docMk/>
-            <pc:sldMk cId="3492267784" sldId="256"/>
-            <ac:spMk id="15" creationId="{E38863DD-D697-7D61-9F05-16B33BC48776}"/>
-          </ac:spMkLst>
-        </pc:spChg>
-        <pc:spChg chg="add del mod">
-          <ac:chgData name="Mariia Timofeeva" userId="ed2f9b69-3ae3-4a8a-85d4-5441ebde9499" providerId="ADAL" clId="{791D3311-16D3-4E4A-BD16-534F49491870}" dt="2025-09-13T22:38:07.326" v="62" actId="478"/>
-          <ac:spMkLst>
-            <pc:docMk/>
-            <pc:sldMk cId="3492267784" sldId="256"/>
-            <ac:spMk id="16" creationId="{BB4B5CF3-F073-BEEA-FBD4-5C91E1A3C8CE}"/>
           </ac:spMkLst>
         </pc:spChg>
         <pc:spChg chg="add mod">
@@ -316,22 +252,6 @@
           <pc:docMk/>
           <pc:sldMk cId="1385968343" sldId="257"/>
         </pc:sldMkLst>
-        <pc:spChg chg="del">
-          <ac:chgData name="Mariia Timofeeva" userId="ed2f9b69-3ae3-4a8a-85d4-5441ebde9499" providerId="ADAL" clId="{791D3311-16D3-4E4A-BD16-534F49491870}" dt="2025-09-13T22:51:13.774" v="114" actId="478"/>
-          <ac:spMkLst>
-            <pc:docMk/>
-            <pc:sldMk cId="1385968343" sldId="257"/>
-            <ac:spMk id="2" creationId="{343256B7-201A-8CB5-35D0-2222CDBE0207}"/>
-          </ac:spMkLst>
-        </pc:spChg>
-        <pc:spChg chg="del">
-          <ac:chgData name="Mariia Timofeeva" userId="ed2f9b69-3ae3-4a8a-85d4-5441ebde9499" providerId="ADAL" clId="{791D3311-16D3-4E4A-BD16-534F49491870}" dt="2025-09-13T22:51:13.774" v="114" actId="478"/>
-          <ac:spMkLst>
-            <pc:docMk/>
-            <pc:sldMk cId="1385968343" sldId="257"/>
-            <ac:spMk id="3" creationId="{21B6264C-92C0-A1AC-2F6D-B64C1BFD2CDA}"/>
-          </ac:spMkLst>
-        </pc:spChg>
         <pc:spChg chg="add mod">
           <ac:chgData name="Mariia Timofeeva" userId="ed2f9b69-3ae3-4a8a-85d4-5441ebde9499" providerId="ADAL" clId="{791D3311-16D3-4E4A-BD16-534F49491870}" dt="2025-09-13T22:53:13.719" v="125" actId="1076"/>
           <ac:spMkLst>
@@ -350,37 +270,21 @@
         </pc:spChg>
       </pc:sldChg>
       <pc:sldChg chg="addSp delSp modSp new mod">
-        <pc:chgData name="Mariia Timofeeva" userId="ed2f9b69-3ae3-4a8a-85d4-5441ebde9499" providerId="ADAL" clId="{791D3311-16D3-4E4A-BD16-534F49491870}" dt="2025-09-14T12:53:10.132" v="1820" actId="1076"/>
+        <pc:chgData name="Mariia Timofeeva" userId="ed2f9b69-3ae3-4a8a-85d4-5441ebde9499" providerId="ADAL" clId="{791D3311-16D3-4E4A-BD16-534F49491870}" dt="2025-09-15T11:23:07.424" v="1878" actId="1076"/>
         <pc:sldMkLst>
           <pc:docMk/>
           <pc:sldMk cId="3893877902" sldId="258"/>
         </pc:sldMkLst>
-        <pc:spChg chg="del">
-          <ac:chgData name="Mariia Timofeeva" userId="ed2f9b69-3ae3-4a8a-85d4-5441ebde9499" providerId="ADAL" clId="{791D3311-16D3-4E4A-BD16-534F49491870}" dt="2025-09-13T22:56:07.838" v="167" actId="478"/>
-          <ac:spMkLst>
-            <pc:docMk/>
-            <pc:sldMk cId="3893877902" sldId="258"/>
-            <ac:spMk id="2" creationId="{BDAD0123-E5FE-A067-0048-06D3A5D376AD}"/>
-          </ac:spMkLst>
-        </pc:spChg>
-        <pc:spChg chg="del">
-          <ac:chgData name="Mariia Timofeeva" userId="ed2f9b69-3ae3-4a8a-85d4-5441ebde9499" providerId="ADAL" clId="{791D3311-16D3-4E4A-BD16-534F49491870}" dt="2025-09-13T22:56:07.838" v="167" actId="478"/>
-          <ac:spMkLst>
-            <pc:docMk/>
-            <pc:sldMk cId="3893877902" sldId="258"/>
-            <ac:spMk id="3" creationId="{E0FF2A83-E89A-7439-D829-CA771B4D1EDB}"/>
-          </ac:spMkLst>
-        </pc:spChg>
         <pc:spChg chg="add mod">
-          <ac:chgData name="Mariia Timofeeva" userId="ed2f9b69-3ae3-4a8a-85d4-5441ebde9499" providerId="ADAL" clId="{791D3311-16D3-4E4A-BD16-534F49491870}" dt="2025-09-14T12:53:10.132" v="1820" actId="1076"/>
+          <ac:chgData name="Mariia Timofeeva" userId="ed2f9b69-3ae3-4a8a-85d4-5441ebde9499" providerId="ADAL" clId="{791D3311-16D3-4E4A-BD16-534F49491870}" dt="2025-09-15T11:23:02.292" v="1877" actId="1076"/>
           <ac:spMkLst>
             <pc:docMk/>
             <pc:sldMk cId="3893877902" sldId="258"/>
             <ac:spMk id="4" creationId="{F4918419-8C69-5315-83DA-63D71BBACE8B}"/>
           </ac:spMkLst>
         </pc:spChg>
-        <pc:spChg chg="add mod">
-          <ac:chgData name="Mariia Timofeeva" userId="ed2f9b69-3ae3-4a8a-85d4-5441ebde9499" providerId="ADAL" clId="{791D3311-16D3-4E4A-BD16-534F49491870}" dt="2025-09-14T10:59:26.751" v="911" actId="20577"/>
+        <pc:spChg chg="add del mod">
+          <ac:chgData name="Mariia Timofeeva" userId="ed2f9b69-3ae3-4a8a-85d4-5441ebde9499" providerId="ADAL" clId="{791D3311-16D3-4E4A-BD16-534F49491870}" dt="2025-09-15T11:22:52.764" v="1866" actId="478"/>
           <ac:spMkLst>
             <pc:docMk/>
             <pc:sldMk cId="3893877902" sldId="258"/>
@@ -395,8 +299,8 @@
             <ac:spMk id="7" creationId="{2CAC1A16-EE90-7580-133E-2042F19E4FE9}"/>
           </ac:spMkLst>
         </pc:spChg>
-        <pc:spChg chg="add mod">
-          <ac:chgData name="Mariia Timofeeva" userId="ed2f9b69-3ae3-4a8a-85d4-5441ebde9499" providerId="ADAL" clId="{791D3311-16D3-4E4A-BD16-534F49491870}" dt="2025-09-14T11:02:34.403" v="973" actId="20577"/>
+        <pc:spChg chg="add del mod">
+          <ac:chgData name="Mariia Timofeeva" userId="ed2f9b69-3ae3-4a8a-85d4-5441ebde9499" providerId="ADAL" clId="{791D3311-16D3-4E4A-BD16-534F49491870}" dt="2025-09-15T11:22:51.294" v="1864" actId="478"/>
           <ac:spMkLst>
             <pc:docMk/>
             <pc:sldMk cId="3893877902" sldId="258"/>
@@ -404,7 +308,7 @@
           </ac:spMkLst>
         </pc:spChg>
         <pc:spChg chg="add mod">
-          <ac:chgData name="Mariia Timofeeva" userId="ed2f9b69-3ae3-4a8a-85d4-5441ebde9499" providerId="ADAL" clId="{791D3311-16D3-4E4A-BD16-534F49491870}" dt="2025-09-14T12:29:48.011" v="1573" actId="20577"/>
+          <ac:chgData name="Mariia Timofeeva" userId="ed2f9b69-3ae3-4a8a-85d4-5441ebde9499" providerId="ADAL" clId="{791D3311-16D3-4E4A-BD16-534F49491870}" dt="2025-09-15T11:23:07.424" v="1878" actId="1076"/>
           <ac:spMkLst>
             <pc:docMk/>
             <pc:sldMk cId="3893877902" sldId="258"/>
@@ -428,7 +332,7 @@
           </ac:spMkLst>
         </pc:spChg>
         <pc:spChg chg="add mod">
-          <ac:chgData name="Mariia Timofeeva" userId="ed2f9b69-3ae3-4a8a-85d4-5441ebde9499" providerId="ADAL" clId="{791D3311-16D3-4E4A-BD16-534F49491870}" dt="2025-09-14T12:29:44.936" v="1571" actId="20577"/>
+          <ac:chgData name="Mariia Timofeeva" userId="ed2f9b69-3ae3-4a8a-85d4-5441ebde9499" providerId="ADAL" clId="{791D3311-16D3-4E4A-BD16-534F49491870}" dt="2025-09-15T11:23:07.424" v="1878" actId="1076"/>
           <ac:spMkLst>
             <pc:docMk/>
             <pc:sldMk cId="3893877902" sldId="258"/>
@@ -436,7 +340,7 @@
           </ac:spMkLst>
         </pc:spChg>
         <pc:spChg chg="add mod">
-          <ac:chgData name="Mariia Timofeeva" userId="ed2f9b69-3ae3-4a8a-85d4-5441ebde9499" providerId="ADAL" clId="{791D3311-16D3-4E4A-BD16-534F49491870}" dt="2025-09-14T12:28:55.005" v="1537" actId="20577"/>
+          <ac:chgData name="Mariia Timofeeva" userId="ed2f9b69-3ae3-4a8a-85d4-5441ebde9499" providerId="ADAL" clId="{791D3311-16D3-4E4A-BD16-534F49491870}" dt="2025-09-15T11:23:07.424" v="1878" actId="1076"/>
           <ac:spMkLst>
             <pc:docMk/>
             <pc:sldMk cId="3893877902" sldId="258"/>
@@ -444,7 +348,7 @@
           </ac:spMkLst>
         </pc:spChg>
         <pc:spChg chg="add mod">
-          <ac:chgData name="Mariia Timofeeva" userId="ed2f9b69-3ae3-4a8a-85d4-5441ebde9499" providerId="ADAL" clId="{791D3311-16D3-4E4A-BD16-534F49491870}" dt="2025-09-14T12:26:57.261" v="1485" actId="255"/>
+          <ac:chgData name="Mariia Timofeeva" userId="ed2f9b69-3ae3-4a8a-85d4-5441ebde9499" providerId="ADAL" clId="{791D3311-16D3-4E4A-BD16-534F49491870}" dt="2025-09-15T11:23:07.424" v="1878" actId="1076"/>
           <ac:spMkLst>
             <pc:docMk/>
             <pc:sldMk cId="3893877902" sldId="258"/>
@@ -452,7 +356,7 @@
           </ac:spMkLst>
         </pc:spChg>
         <pc:spChg chg="add mod">
-          <ac:chgData name="Mariia Timofeeva" userId="ed2f9b69-3ae3-4a8a-85d4-5441ebde9499" providerId="ADAL" clId="{791D3311-16D3-4E4A-BD16-534F49491870}" dt="2025-09-14T12:26:27.532" v="1481" actId="20577"/>
+          <ac:chgData name="Mariia Timofeeva" userId="ed2f9b69-3ae3-4a8a-85d4-5441ebde9499" providerId="ADAL" clId="{791D3311-16D3-4E4A-BD16-534F49491870}" dt="2025-09-15T11:23:07.424" v="1878" actId="1076"/>
           <ac:spMkLst>
             <pc:docMk/>
             <pc:sldMk cId="3893877902" sldId="258"/>
@@ -500,7 +404,7 @@
           </ac:spMkLst>
         </pc:spChg>
         <pc:spChg chg="add mod">
-          <ac:chgData name="Mariia Timofeeva" userId="ed2f9b69-3ae3-4a8a-85d4-5441ebde9499" providerId="ADAL" clId="{791D3311-16D3-4E4A-BD16-534F49491870}" dt="2025-09-14T12:23:24.495" v="1453" actId="1076"/>
+          <ac:chgData name="Mariia Timofeeva" userId="ed2f9b69-3ae3-4a8a-85d4-5441ebde9499" providerId="ADAL" clId="{791D3311-16D3-4E4A-BD16-534F49491870}" dt="2025-09-15T11:23:07.424" v="1878" actId="1076"/>
           <ac:spMkLst>
             <pc:docMk/>
             <pc:sldMk cId="3893877902" sldId="258"/>
@@ -508,7 +412,7 @@
           </ac:spMkLst>
         </pc:spChg>
         <pc:spChg chg="add mod">
-          <ac:chgData name="Mariia Timofeeva" userId="ed2f9b69-3ae3-4a8a-85d4-5441ebde9499" providerId="ADAL" clId="{791D3311-16D3-4E4A-BD16-534F49491870}" dt="2025-09-14T12:23:24.495" v="1453" actId="1076"/>
+          <ac:chgData name="Mariia Timofeeva" userId="ed2f9b69-3ae3-4a8a-85d4-5441ebde9499" providerId="ADAL" clId="{791D3311-16D3-4E4A-BD16-534F49491870}" dt="2025-09-15T11:23:07.424" v="1878" actId="1076"/>
           <ac:spMkLst>
             <pc:docMk/>
             <pc:sldMk cId="3893877902" sldId="258"/>
@@ -516,7 +420,7 @@
           </ac:spMkLst>
         </pc:spChg>
         <pc:spChg chg="add mod">
-          <ac:chgData name="Mariia Timofeeva" userId="ed2f9b69-3ae3-4a8a-85d4-5441ebde9499" providerId="ADAL" clId="{791D3311-16D3-4E4A-BD16-534F49491870}" dt="2025-09-14T12:53:05.825" v="1819" actId="1076"/>
+          <ac:chgData name="Mariia Timofeeva" userId="ed2f9b69-3ae3-4a8a-85d4-5441ebde9499" providerId="ADAL" clId="{791D3311-16D3-4E4A-BD16-534F49491870}" dt="2025-09-15T11:23:07.424" v="1878" actId="1076"/>
           <ac:spMkLst>
             <pc:docMk/>
             <pc:sldMk cId="3893877902" sldId="258"/>
@@ -540,7 +444,7 @@
           </ac:picMkLst>
         </pc:picChg>
         <pc:cxnChg chg="add mod">
-          <ac:chgData name="Mariia Timofeeva" userId="ed2f9b69-3ae3-4a8a-85d4-5441ebde9499" providerId="ADAL" clId="{791D3311-16D3-4E4A-BD16-534F49491870}" dt="2025-09-14T12:22:31.881" v="1443" actId="1076"/>
+          <ac:chgData name="Mariia Timofeeva" userId="ed2f9b69-3ae3-4a8a-85d4-5441ebde9499" providerId="ADAL" clId="{791D3311-16D3-4E4A-BD16-534F49491870}" dt="2025-09-15T11:23:07.424" v="1878" actId="1076"/>
           <ac:cxnSpMkLst>
             <pc:docMk/>
             <pc:sldMk cId="3893877902" sldId="258"/>
@@ -556,7 +460,7 @@
           </ac:cxnSpMkLst>
         </pc:cxnChg>
         <pc:cxnChg chg="add mod">
-          <ac:chgData name="Mariia Timofeeva" userId="ed2f9b69-3ae3-4a8a-85d4-5441ebde9499" providerId="ADAL" clId="{791D3311-16D3-4E4A-BD16-534F49491870}" dt="2025-09-14T12:23:24.495" v="1453" actId="1076"/>
+          <ac:chgData name="Mariia Timofeeva" userId="ed2f9b69-3ae3-4a8a-85d4-5441ebde9499" providerId="ADAL" clId="{791D3311-16D3-4E4A-BD16-534F49491870}" dt="2025-09-15T11:23:07.424" v="1878" actId="1076"/>
           <ac:cxnSpMkLst>
             <pc:docMk/>
             <pc:sldMk cId="3893877902" sldId="258"/>
@@ -580,26 +484,18 @@
           </ac:cxnSpMkLst>
         </pc:cxnChg>
       </pc:sldChg>
-      <pc:sldChg chg="addSp delSp modSp new mod ord">
-        <pc:chgData name="Mariia Timofeeva" userId="ed2f9b69-3ae3-4a8a-85d4-5441ebde9499" providerId="ADAL" clId="{791D3311-16D3-4E4A-BD16-534F49491870}" dt="2025-09-14T11:35:11.554" v="1140" actId="14100"/>
+      <pc:sldChg chg="addSp delSp modSp new mod ord delAnim modAnim">
+        <pc:chgData name="Mariia Timofeeva" userId="ed2f9b69-3ae3-4a8a-85d4-5441ebde9499" providerId="ADAL" clId="{791D3311-16D3-4E4A-BD16-534F49491870}" dt="2025-09-15T12:33:49.739" v="2108" actId="14100"/>
         <pc:sldMkLst>
           <pc:docMk/>
           <pc:sldMk cId="3362638046" sldId="259"/>
         </pc:sldMkLst>
-        <pc:spChg chg="del">
-          <ac:chgData name="Mariia Timofeeva" userId="ed2f9b69-3ae3-4a8a-85d4-5441ebde9499" providerId="ADAL" clId="{791D3311-16D3-4E4A-BD16-534F49491870}" dt="2025-09-13T22:56:58.726" v="170" actId="478"/>
+        <pc:spChg chg="add mod">
+          <ac:chgData name="Mariia Timofeeva" userId="ed2f9b69-3ae3-4a8a-85d4-5441ebde9499" providerId="ADAL" clId="{791D3311-16D3-4E4A-BD16-534F49491870}" dt="2025-09-15T12:22:38.253" v="2101" actId="20577"/>
           <ac:spMkLst>
             <pc:docMk/>
             <pc:sldMk cId="3362638046" sldId="259"/>
-            <ac:spMk id="2" creationId="{4B6E30BF-349C-040F-655D-EFB182276C78}"/>
-          </ac:spMkLst>
-        </pc:spChg>
-        <pc:spChg chg="del">
-          <ac:chgData name="Mariia Timofeeva" userId="ed2f9b69-3ae3-4a8a-85d4-5441ebde9499" providerId="ADAL" clId="{791D3311-16D3-4E4A-BD16-534F49491870}" dt="2025-09-13T22:56:58.726" v="170" actId="478"/>
-          <ac:spMkLst>
-            <pc:docMk/>
-            <pc:sldMk cId="3362638046" sldId="259"/>
-            <ac:spMk id="3" creationId="{EA74AB8F-DD45-EB8E-4A1F-1BCE4317AD28}"/>
+            <ac:spMk id="2" creationId="{1AD52D62-B718-EB55-BCC8-61C7CB06552A}"/>
           </ac:spMkLst>
         </pc:spChg>
         <pc:spChg chg="add mod">
@@ -619,7 +515,7 @@
           </ac:spMkLst>
         </pc:spChg>
         <pc:spChg chg="add mod">
-          <ac:chgData name="Mariia Timofeeva" userId="ed2f9b69-3ae3-4a8a-85d4-5441ebde9499" providerId="ADAL" clId="{791D3311-16D3-4E4A-BD16-534F49491870}" dt="2025-09-14T10:37:37.785" v="855" actId="1076"/>
+          <ac:chgData name="Mariia Timofeeva" userId="ed2f9b69-3ae3-4a8a-85d4-5441ebde9499" providerId="ADAL" clId="{791D3311-16D3-4E4A-BD16-534F49491870}" dt="2025-09-15T12:12:24.937" v="2086" actId="164"/>
           <ac:spMkLst>
             <pc:docMk/>
             <pc:sldMk cId="3362638046" sldId="259"/>
@@ -635,7 +531,7 @@
           </ac:spMkLst>
         </pc:spChg>
         <pc:spChg chg="add mod">
-          <ac:chgData name="Mariia Timofeeva" userId="ed2f9b69-3ae3-4a8a-85d4-5441ebde9499" providerId="ADAL" clId="{791D3311-16D3-4E4A-BD16-534F49491870}" dt="2025-09-14T10:37:37.785" v="855" actId="1076"/>
+          <ac:chgData name="Mariia Timofeeva" userId="ed2f9b69-3ae3-4a8a-85d4-5441ebde9499" providerId="ADAL" clId="{791D3311-16D3-4E4A-BD16-534F49491870}" dt="2025-09-15T12:09:32.308" v="1991" actId="20577"/>
           <ac:spMkLst>
             <pc:docMk/>
             <pc:sldMk cId="3362638046" sldId="259"/>
@@ -643,15 +539,31 @@
           </ac:spMkLst>
         </pc:spChg>
         <pc:spChg chg="add mod">
-          <ac:chgData name="Mariia Timofeeva" userId="ed2f9b69-3ae3-4a8a-85d4-5441ebde9499" providerId="ADAL" clId="{791D3311-16D3-4E4A-BD16-534F49491870}" dt="2025-09-14T10:37:37.785" v="855" actId="1076"/>
+          <ac:chgData name="Mariia Timofeeva" userId="ed2f9b69-3ae3-4a8a-85d4-5441ebde9499" providerId="ADAL" clId="{791D3311-16D3-4E4A-BD16-534F49491870}" dt="2025-09-15T12:12:20.182" v="2085" actId="1076"/>
           <ac:spMkLst>
             <pc:docMk/>
             <pc:sldMk cId="3362638046" sldId="259"/>
             <ac:spMk id="15" creationId="{598531F1-FCD1-B277-9D3C-4E5BFE52804C}"/>
           </ac:spMkLst>
         </pc:spChg>
+        <pc:grpChg chg="add mod">
+          <ac:chgData name="Mariia Timofeeva" userId="ed2f9b69-3ae3-4a8a-85d4-5441ebde9499" providerId="ADAL" clId="{791D3311-16D3-4E4A-BD16-534F49491870}" dt="2025-09-15T12:12:19.153" v="2084" actId="164"/>
+          <ac:grpSpMkLst>
+            <pc:docMk/>
+            <pc:sldMk cId="3362638046" sldId="259"/>
+            <ac:grpSpMk id="3" creationId="{8AAACE80-33C3-635D-C29C-9AF0AB6C9CD6}"/>
+          </ac:grpSpMkLst>
+        </pc:grpChg>
+        <pc:grpChg chg="add mod">
+          <ac:chgData name="Mariia Timofeeva" userId="ed2f9b69-3ae3-4a8a-85d4-5441ebde9499" providerId="ADAL" clId="{791D3311-16D3-4E4A-BD16-534F49491870}" dt="2025-09-15T12:12:24.937" v="2086" actId="164"/>
+          <ac:grpSpMkLst>
+            <pc:docMk/>
+            <pc:sldMk cId="3362638046" sldId="259"/>
+            <ac:grpSpMk id="5" creationId="{0A565874-E1E5-15BF-9538-0C3DDF80FB5B}"/>
+          </ac:grpSpMkLst>
+        </pc:grpChg>
         <pc:picChg chg="add mod ord modCrop">
-          <ac:chgData name="Mariia Timofeeva" userId="ed2f9b69-3ae3-4a8a-85d4-5441ebde9499" providerId="ADAL" clId="{791D3311-16D3-4E4A-BD16-534F49491870}" dt="2025-09-14T11:34:33.130" v="1137" actId="1076"/>
+          <ac:chgData name="Mariia Timofeeva" userId="ed2f9b69-3ae3-4a8a-85d4-5441ebde9499" providerId="ADAL" clId="{791D3311-16D3-4E4A-BD16-534F49491870}" dt="2025-09-15T12:12:24.937" v="2086" actId="164"/>
           <ac:picMkLst>
             <pc:docMk/>
             <pc:sldMk cId="3362638046" sldId="259"/>
@@ -659,7 +571,15 @@
           </ac:picMkLst>
         </pc:picChg>
         <pc:picChg chg="add mod">
-          <ac:chgData name="Mariia Timofeeva" userId="ed2f9b69-3ae3-4a8a-85d4-5441ebde9499" providerId="ADAL" clId="{791D3311-16D3-4E4A-BD16-534F49491870}" dt="2025-09-14T11:34:35.471" v="1138" actId="1076"/>
+          <ac:chgData name="Mariia Timofeeva" userId="ed2f9b69-3ae3-4a8a-85d4-5441ebde9499" providerId="ADAL" clId="{791D3311-16D3-4E4A-BD16-534F49491870}" dt="2025-09-15T12:33:49.739" v="2108" actId="14100"/>
+          <ac:picMkLst>
+            <pc:docMk/>
+            <pc:sldMk cId="3362638046" sldId="259"/>
+            <ac:picMk id="8" creationId="{5DA8D231-734C-7864-49AC-E7E6F2A88A4A}"/>
+          </ac:picMkLst>
+        </pc:picChg>
+        <pc:picChg chg="add del mod">
+          <ac:chgData name="Mariia Timofeeva" userId="ed2f9b69-3ae3-4a8a-85d4-5441ebde9499" providerId="ADAL" clId="{791D3311-16D3-4E4A-BD16-534F49491870}" dt="2025-09-15T12:33:26.882" v="2102" actId="478"/>
           <ac:picMkLst>
             <pc:docMk/>
             <pc:sldMk cId="3362638046" sldId="259"/>
@@ -667,28 +587,12 @@
           </ac:picMkLst>
         </pc:picChg>
       </pc:sldChg>
-      <pc:sldChg chg="addSp delSp modSp new mod modNotesTx">
-        <pc:chgData name="Mariia Timofeeva" userId="ed2f9b69-3ae3-4a8a-85d4-5441ebde9499" providerId="ADAL" clId="{791D3311-16D3-4E4A-BD16-534F49491870}" dt="2025-09-14T11:02:57.379" v="974" actId="2710"/>
+      <pc:sldChg chg="addSp delSp modSp new mod ord modNotesTx">
+        <pc:chgData name="Mariia Timofeeva" userId="ed2f9b69-3ae3-4a8a-85d4-5441ebde9499" providerId="ADAL" clId="{791D3311-16D3-4E4A-BD16-534F49491870}" dt="2025-09-15T11:29:01.190" v="1880"/>
         <pc:sldMkLst>
           <pc:docMk/>
           <pc:sldMk cId="4210638896" sldId="260"/>
         </pc:sldMkLst>
-        <pc:spChg chg="del">
-          <ac:chgData name="Mariia Timofeeva" userId="ed2f9b69-3ae3-4a8a-85d4-5441ebde9499" providerId="ADAL" clId="{791D3311-16D3-4E4A-BD16-534F49491870}" dt="2025-09-13T23:02:03.326" v="283" actId="478"/>
-          <ac:spMkLst>
-            <pc:docMk/>
-            <pc:sldMk cId="4210638896" sldId="260"/>
-            <ac:spMk id="2" creationId="{FC8F3F10-C372-E3CA-6BD4-5F225CC7A740}"/>
-          </ac:spMkLst>
-        </pc:spChg>
-        <pc:spChg chg="del">
-          <ac:chgData name="Mariia Timofeeva" userId="ed2f9b69-3ae3-4a8a-85d4-5441ebde9499" providerId="ADAL" clId="{791D3311-16D3-4E4A-BD16-534F49491870}" dt="2025-09-13T23:02:03.326" v="283" actId="478"/>
-          <ac:spMkLst>
-            <pc:docMk/>
-            <pc:sldMk cId="4210638896" sldId="260"/>
-            <ac:spMk id="3" creationId="{92689176-C6F1-7E23-94BA-EE539B793EF5}"/>
-          </ac:spMkLst>
-        </pc:spChg>
         <pc:spChg chg="add del mod">
           <ac:chgData name="Mariia Timofeeva" userId="ed2f9b69-3ae3-4a8a-85d4-5441ebde9499" providerId="ADAL" clId="{791D3311-16D3-4E4A-BD16-534F49491870}" dt="2025-09-14T11:01:24.762" v="939" actId="21"/>
           <ac:spMkLst>
@@ -698,7 +602,7 @@
           </ac:spMkLst>
         </pc:spChg>
         <pc:spChg chg="add mod">
-          <ac:chgData name="Mariia Timofeeva" userId="ed2f9b69-3ae3-4a8a-85d4-5441ebde9499" providerId="ADAL" clId="{791D3311-16D3-4E4A-BD16-534F49491870}" dt="2025-09-14T11:02:57.379" v="974" actId="2710"/>
+          <ac:chgData name="Mariia Timofeeva" userId="ed2f9b69-3ae3-4a8a-85d4-5441ebde9499" providerId="ADAL" clId="{791D3311-16D3-4E4A-BD16-534F49491870}" dt="2025-09-15T11:07:23.491" v="1862" actId="20577"/>
           <ac:spMkLst>
             <pc:docMk/>
             <pc:sldMk cId="4210638896" sldId="260"/>
@@ -721,31 +625,15 @@
             <ac:spMk id="8" creationId="{6A2E0C74-3D9A-444F-B029-0F8389C6D1FF}"/>
           </ac:spMkLst>
         </pc:spChg>
-        <pc:spChg chg="add">
-          <ac:chgData name="Mariia Timofeeva" userId="ed2f9b69-3ae3-4a8a-85d4-5441ebde9499" providerId="ADAL" clId="{791D3311-16D3-4E4A-BD16-534F49491870}" dt="2025-09-13T23:09:17.624" v="421"/>
-          <ac:spMkLst>
-            <pc:docMk/>
-            <pc:sldMk cId="4210638896" sldId="260"/>
-            <ac:spMk id="9" creationId="{0F435EC7-AF70-0949-2BBA-2066F2168DBF}"/>
-          </ac:spMkLst>
-        </pc:spChg>
-        <pc:spChg chg="add">
-          <ac:chgData name="Mariia Timofeeva" userId="ed2f9b69-3ae3-4a8a-85d4-5441ebde9499" providerId="ADAL" clId="{791D3311-16D3-4E4A-BD16-534F49491870}" dt="2025-09-13T23:09:27.844" v="422"/>
-          <ac:spMkLst>
-            <pc:docMk/>
-            <pc:sldMk cId="4210638896" sldId="260"/>
-            <ac:spMk id="10" creationId="{98DEA638-778E-4073-7360-1A5D5C99FD60}"/>
-          </ac:spMkLst>
-        </pc:spChg>
       </pc:sldChg>
       <pc:sldChg chg="addSp delSp modSp add mod modNotesTx">
-        <pc:chgData name="Mariia Timofeeva" userId="ed2f9b69-3ae3-4a8a-85d4-5441ebde9499" providerId="ADAL" clId="{791D3311-16D3-4E4A-BD16-534F49491870}" dt="2025-09-14T12:49:59.990" v="1818" actId="1076"/>
+        <pc:chgData name="Mariia Timofeeva" userId="ed2f9b69-3ae3-4a8a-85d4-5441ebde9499" providerId="ADAL" clId="{791D3311-16D3-4E4A-BD16-534F49491870}" dt="2025-09-15T11:42:43.931" v="1890" actId="1076"/>
         <pc:sldMkLst>
           <pc:docMk/>
           <pc:sldMk cId="3048647061" sldId="261"/>
         </pc:sldMkLst>
-        <pc:spChg chg="add mod">
-          <ac:chgData name="Mariia Timofeeva" userId="ed2f9b69-3ae3-4a8a-85d4-5441ebde9499" providerId="ADAL" clId="{791D3311-16D3-4E4A-BD16-534F49491870}" dt="2025-09-14T11:08:09.253" v="1020"/>
+        <pc:spChg chg="add del mod">
+          <ac:chgData name="Mariia Timofeeva" userId="ed2f9b69-3ae3-4a8a-85d4-5441ebde9499" providerId="ADAL" clId="{791D3311-16D3-4E4A-BD16-534F49491870}" dt="2025-09-15T11:42:39.846" v="1889" actId="478"/>
           <ac:spMkLst>
             <pc:docMk/>
             <pc:sldMk cId="3048647061" sldId="261"/>
@@ -753,7 +641,7 @@
           </ac:spMkLst>
         </pc:spChg>
         <pc:spChg chg="add mod">
-          <ac:chgData name="Mariia Timofeeva" userId="ed2f9b69-3ae3-4a8a-85d4-5441ebde9499" providerId="ADAL" clId="{791D3311-16D3-4E4A-BD16-534F49491870}" dt="2025-09-14T12:49:59.990" v="1818" actId="1076"/>
+          <ac:chgData name="Mariia Timofeeva" userId="ed2f9b69-3ae3-4a8a-85d4-5441ebde9499" providerId="ADAL" clId="{791D3311-16D3-4E4A-BD16-534F49491870}" dt="2025-09-15T11:42:43.931" v="1890" actId="1076"/>
           <ac:spMkLst>
             <pc:docMk/>
             <pc:sldMk cId="3048647061" sldId="261"/>
@@ -1031,30 +919,6 @@
           <pc:docMk/>
           <pc:sldMk cId="2914039068" sldId="262"/>
         </pc:sldMkLst>
-        <pc:spChg chg="del">
-          <ac:chgData name="Mariia Timofeeva" userId="ed2f9b69-3ae3-4a8a-85d4-5441ebde9499" providerId="ADAL" clId="{791D3311-16D3-4E4A-BD16-534F49491870}" dt="2025-09-13T23:22:39.500" v="522" actId="478"/>
-          <ac:spMkLst>
-            <pc:docMk/>
-            <pc:sldMk cId="2914039068" sldId="262"/>
-            <ac:spMk id="2" creationId="{B5C1905F-C7E3-B108-C382-47DD2229B47B}"/>
-          </ac:spMkLst>
-        </pc:spChg>
-        <pc:spChg chg="del">
-          <ac:chgData name="Mariia Timofeeva" userId="ed2f9b69-3ae3-4a8a-85d4-5441ebde9499" providerId="ADAL" clId="{791D3311-16D3-4E4A-BD16-534F49491870}" dt="2025-09-13T23:22:39.500" v="522" actId="478"/>
-          <ac:spMkLst>
-            <pc:docMk/>
-            <pc:sldMk cId="2914039068" sldId="262"/>
-            <ac:spMk id="3" creationId="{8D500028-B216-DB6A-6A33-573353D0D831}"/>
-          </ac:spMkLst>
-        </pc:spChg>
-        <pc:spChg chg="add mod">
-          <ac:chgData name="Mariia Timofeeva" userId="ed2f9b69-3ae3-4a8a-85d4-5441ebde9499" providerId="ADAL" clId="{791D3311-16D3-4E4A-BD16-534F49491870}" dt="2025-09-13T23:26:17.532" v="583" actId="1076"/>
-          <ac:spMkLst>
-            <pc:docMk/>
-            <pc:sldMk cId="2914039068" sldId="262"/>
-            <ac:spMk id="4" creationId="{285F0811-7267-505D-90A5-DFAD0384333A}"/>
-          </ac:spMkLst>
-        </pc:spChg>
         <pc:spChg chg="add mod">
           <ac:chgData name="Mariia Timofeeva" userId="ed2f9b69-3ae3-4a8a-85d4-5441ebde9499" providerId="ADAL" clId="{791D3311-16D3-4E4A-BD16-534F49491870}" dt="2025-09-14T11:04:47.328" v="988" actId="20577"/>
           <ac:spMkLst>
@@ -1063,109 +927,13 @@
             <ac:spMk id="6" creationId="{7BB88193-5B44-46D7-52E9-D3F74012DEEF}"/>
           </ac:spMkLst>
         </pc:spChg>
-        <pc:spChg chg="add mod">
-          <ac:chgData name="Mariia Timofeeva" userId="ed2f9b69-3ae3-4a8a-85d4-5441ebde9499" providerId="ADAL" clId="{791D3311-16D3-4E4A-BD16-534F49491870}" dt="2025-09-13T23:32:01.999" v="668" actId="1076"/>
-          <ac:spMkLst>
-            <pc:docMk/>
-            <pc:sldMk cId="2914039068" sldId="262"/>
-            <ac:spMk id="8" creationId="{7857EEE0-54C6-9F4E-A572-2036EC26BB05}"/>
-          </ac:spMkLst>
-        </pc:spChg>
-        <pc:spChg chg="add mod">
-          <ac:chgData name="Mariia Timofeeva" userId="ed2f9b69-3ae3-4a8a-85d4-5441ebde9499" providerId="ADAL" clId="{791D3311-16D3-4E4A-BD16-534F49491870}" dt="2025-09-13T23:30:48.812" v="646" actId="1076"/>
-          <ac:spMkLst>
-            <pc:docMk/>
-            <pc:sldMk cId="2914039068" sldId="262"/>
-            <ac:spMk id="9" creationId="{55C39C3B-100E-BC68-DCB2-64EC099BCD4B}"/>
-          </ac:spMkLst>
-        </pc:spChg>
-        <pc:spChg chg="add mod">
-          <ac:chgData name="Mariia Timofeeva" userId="ed2f9b69-3ae3-4a8a-85d4-5441ebde9499" providerId="ADAL" clId="{791D3311-16D3-4E4A-BD16-534F49491870}" dt="2025-09-13T23:31:52.634" v="665" actId="1076"/>
-          <ac:spMkLst>
-            <pc:docMk/>
-            <pc:sldMk cId="2914039068" sldId="262"/>
-            <ac:spMk id="10" creationId="{D891F1CA-87D7-C4B6-6202-E8E15552C9B5}"/>
-          </ac:spMkLst>
-        </pc:spChg>
-        <pc:spChg chg="add mod">
-          <ac:chgData name="Mariia Timofeeva" userId="ed2f9b69-3ae3-4a8a-85d4-5441ebde9499" providerId="ADAL" clId="{791D3311-16D3-4E4A-BD16-534F49491870}" dt="2025-09-13T23:31:34.942" v="662" actId="1076"/>
-          <ac:spMkLst>
-            <pc:docMk/>
-            <pc:sldMk cId="2914039068" sldId="262"/>
-            <ac:spMk id="11" creationId="{29529C54-F2AE-2BA3-C799-7882EEB4CE10}"/>
-          </ac:spMkLst>
-        </pc:spChg>
-        <pc:graphicFrameChg chg="add mod">
-          <ac:chgData name="Mariia Timofeeva" userId="ed2f9b69-3ae3-4a8a-85d4-5441ebde9499" providerId="ADAL" clId="{791D3311-16D3-4E4A-BD16-534F49491870}" dt="2025-09-13T23:28:36.452" v="626"/>
-          <ac:graphicFrameMkLst>
-            <pc:docMk/>
-            <pc:sldMk cId="2914039068" sldId="262"/>
-            <ac:graphicFrameMk id="14" creationId="{C7060D62-2CF1-A5F3-7EC3-A32274441378}"/>
-          </ac:graphicFrameMkLst>
-        </pc:graphicFrameChg>
-        <pc:picChg chg="add del mod modCrop">
-          <ac:chgData name="Mariia Timofeeva" userId="ed2f9b69-3ae3-4a8a-85d4-5441ebde9499" providerId="ADAL" clId="{791D3311-16D3-4E4A-BD16-534F49491870}" dt="2025-09-13T23:28:28.628" v="625" actId="21"/>
-          <ac:picMkLst>
-            <pc:docMk/>
-            <pc:sldMk cId="2914039068" sldId="262"/>
-            <ac:picMk id="12" creationId="{D5937A35-70AE-30BB-0C75-E84D907AACA9}"/>
-          </ac:picMkLst>
-        </pc:picChg>
-        <pc:picChg chg="add mod modCrop">
-          <ac:chgData name="Mariia Timofeeva" userId="ed2f9b69-3ae3-4a8a-85d4-5441ebde9499" providerId="ADAL" clId="{791D3311-16D3-4E4A-BD16-534F49491870}" dt="2025-09-13T23:31:56.195" v="666" actId="1076"/>
-          <ac:picMkLst>
-            <pc:docMk/>
-            <pc:sldMk cId="2914039068" sldId="262"/>
-            <ac:picMk id="13" creationId="{594CABA4-1EA7-949F-6AAC-7A3D24EEF826}"/>
-          </ac:picMkLst>
-        </pc:picChg>
-        <pc:picChg chg="add mod modCrop">
-          <ac:chgData name="Mariia Timofeeva" userId="ed2f9b69-3ae3-4a8a-85d4-5441ebde9499" providerId="ADAL" clId="{791D3311-16D3-4E4A-BD16-534F49491870}" dt="2025-09-13T23:32:00.262" v="667" actId="1076"/>
-          <ac:picMkLst>
-            <pc:docMk/>
-            <pc:sldMk cId="2914039068" sldId="262"/>
-            <ac:picMk id="15" creationId="{D5C2DC36-4569-16DD-0B61-586D0B4AEC78}"/>
-          </ac:picMkLst>
-        </pc:picChg>
-        <pc:picChg chg="add mod ord">
-          <ac:chgData name="Mariia Timofeeva" userId="ed2f9b69-3ae3-4a8a-85d4-5441ebde9499" providerId="ADAL" clId="{791D3311-16D3-4E4A-BD16-534F49491870}" dt="2025-09-13T23:32:31.395" v="676" actId="167"/>
-          <ac:picMkLst>
-            <pc:docMk/>
-            <pc:sldMk cId="2914039068" sldId="262"/>
-            <ac:picMk id="16" creationId="{99E1CDB3-6A54-5D67-8051-7D2A770C3E9F}"/>
-          </ac:picMkLst>
-        </pc:picChg>
-        <pc:picChg chg="add mod ord">
-          <ac:chgData name="Mariia Timofeeva" userId="ed2f9b69-3ae3-4a8a-85d4-5441ebde9499" providerId="ADAL" clId="{791D3311-16D3-4E4A-BD16-534F49491870}" dt="2025-09-13T23:32:24.045" v="673" actId="167"/>
-          <ac:picMkLst>
-            <pc:docMk/>
-            <pc:sldMk cId="2914039068" sldId="262"/>
-            <ac:picMk id="17" creationId="{F9EA62F3-A16E-CF99-CB99-0B588B88627D}"/>
-          </ac:picMkLst>
-        </pc:picChg>
       </pc:sldChg>
       <pc:sldChg chg="addSp delSp modSp new mod">
-        <pc:chgData name="Mariia Timofeeva" userId="ed2f9b69-3ae3-4a8a-85d4-5441ebde9499" providerId="ADAL" clId="{791D3311-16D3-4E4A-BD16-534F49491870}" dt="2025-09-14T11:14:11.521" v="1127" actId="20577"/>
+        <pc:chgData name="Mariia Timofeeva" userId="ed2f9b69-3ae3-4a8a-85d4-5441ebde9499" providerId="ADAL" clId="{791D3311-16D3-4E4A-BD16-534F49491870}" dt="2025-09-15T12:08:56.996" v="1989" actId="20577"/>
         <pc:sldMkLst>
           <pc:docMk/>
           <pc:sldMk cId="2682957654" sldId="263"/>
         </pc:sldMkLst>
-        <pc:spChg chg="del">
-          <ac:chgData name="Mariia Timofeeva" userId="ed2f9b69-3ae3-4a8a-85d4-5441ebde9499" providerId="ADAL" clId="{791D3311-16D3-4E4A-BD16-534F49491870}" dt="2025-09-13T23:42:20.672" v="734" actId="478"/>
-          <ac:spMkLst>
-            <pc:docMk/>
-            <pc:sldMk cId="2682957654" sldId="263"/>
-            <ac:spMk id="2" creationId="{F75F40D7-4A98-C250-A25E-F8BDD4D308AD}"/>
-          </ac:spMkLst>
-        </pc:spChg>
-        <pc:spChg chg="del">
-          <ac:chgData name="Mariia Timofeeva" userId="ed2f9b69-3ae3-4a8a-85d4-5441ebde9499" providerId="ADAL" clId="{791D3311-16D3-4E4A-BD16-534F49491870}" dt="2025-09-13T23:42:20.672" v="734" actId="478"/>
-          <ac:spMkLst>
-            <pc:docMk/>
-            <pc:sldMk cId="2682957654" sldId="263"/>
-            <ac:spMk id="3" creationId="{1EF27249-D7B2-887D-3FF7-DB6FB9B3CB37}"/>
-          </ac:spMkLst>
-        </pc:spChg>
         <pc:spChg chg="add mod">
           <ac:chgData name="Mariia Timofeeva" userId="ed2f9b69-3ae3-4a8a-85d4-5441ebde9499" providerId="ADAL" clId="{791D3311-16D3-4E4A-BD16-534F49491870}" dt="2025-09-14T11:14:11.521" v="1127" actId="20577"/>
           <ac:spMkLst>
@@ -1175,7 +943,7 @@
           </ac:spMkLst>
         </pc:spChg>
         <pc:spChg chg="add mod">
-          <ac:chgData name="Mariia Timofeeva" userId="ed2f9b69-3ae3-4a8a-85d4-5441ebde9499" providerId="ADAL" clId="{791D3311-16D3-4E4A-BD16-534F49491870}" dt="2025-09-14T11:07:49.539" v="1018" actId="20577"/>
+          <ac:chgData name="Mariia Timofeeva" userId="ed2f9b69-3ae3-4a8a-85d4-5441ebde9499" providerId="ADAL" clId="{791D3311-16D3-4E4A-BD16-534F49491870}" dt="2025-09-15T12:08:56.996" v="1989" actId="20577"/>
           <ac:spMkLst>
             <pc:docMk/>
             <pc:sldMk cId="2682957654" sldId="263"/>
@@ -1184,7 +952,7 @@
         </pc:spChg>
       </pc:sldChg>
       <pc:sldChg chg="addSp delSp modSp new mod">
-        <pc:chgData name="Mariia Timofeeva" userId="ed2f9b69-3ae3-4a8a-85d4-5441ebde9499" providerId="ADAL" clId="{791D3311-16D3-4E4A-BD16-534F49491870}" dt="2025-09-14T11:13:49.710" v="1117" actId="1076"/>
+        <pc:chgData name="Mariia Timofeeva" userId="ed2f9b69-3ae3-4a8a-85d4-5441ebde9499" providerId="ADAL" clId="{791D3311-16D3-4E4A-BD16-534F49491870}" dt="2025-09-15T11:41:20.763" v="1888" actId="20577"/>
         <pc:sldMkLst>
           <pc:docMk/>
           <pc:sldMk cId="3463502355" sldId="264"/>
@@ -1206,7 +974,7 @@
           </ac:spMkLst>
         </pc:spChg>
         <pc:spChg chg="add mod">
-          <ac:chgData name="Mariia Timofeeva" userId="ed2f9b69-3ae3-4a8a-85d4-5441ebde9499" providerId="ADAL" clId="{791D3311-16D3-4E4A-BD16-534F49491870}" dt="2025-09-14T11:07:02.888" v="1017" actId="20577"/>
+          <ac:chgData name="Mariia Timofeeva" userId="ed2f9b69-3ae3-4a8a-85d4-5441ebde9499" providerId="ADAL" clId="{791D3311-16D3-4E4A-BD16-534F49491870}" dt="2025-09-15T11:41:20.763" v="1888" actId="20577"/>
           <ac:spMkLst>
             <pc:docMk/>
             <pc:sldMk cId="3463502355" sldId="264"/>
@@ -1255,7 +1023,7 @@
         </pc:picChg>
       </pc:sldChg>
       <pc:sldChg chg="addSp delSp modSp new mod">
-        <pc:chgData name="Mariia Timofeeva" userId="ed2f9b69-3ae3-4a8a-85d4-5441ebde9499" providerId="ADAL" clId="{791D3311-16D3-4E4A-BD16-534F49491870}" dt="2025-09-14T11:13:34.655" v="1114" actId="1076"/>
+        <pc:chgData name="Mariia Timofeeva" userId="ed2f9b69-3ae3-4a8a-85d4-5441ebde9499" providerId="ADAL" clId="{791D3311-16D3-4E4A-BD16-534F49491870}" dt="2025-09-15T12:07:56.463" v="1943" actId="1076"/>
         <pc:sldMkLst>
           <pc:docMk/>
           <pc:sldMk cId="741178744" sldId="265"/>
@@ -1268,6 +1036,14 @@
             <ac:spMk id="2" creationId="{72CB9BA9-4F60-C7D1-2EE9-3F56B9455702}"/>
           </ac:spMkLst>
         </pc:spChg>
+        <pc:spChg chg="add mod">
+          <ac:chgData name="Mariia Timofeeva" userId="ed2f9b69-3ae3-4a8a-85d4-5441ebde9499" providerId="ADAL" clId="{791D3311-16D3-4E4A-BD16-534F49491870}" dt="2025-09-15T12:07:13.632" v="1906" actId="1076"/>
+          <ac:spMkLst>
+            <pc:docMk/>
+            <pc:sldMk cId="741178744" sldId="265"/>
+            <ac:spMk id="3" creationId="{72E05A3A-5D74-FB34-5E5E-BD48C0DDD904}"/>
+          </ac:spMkLst>
+        </pc:spChg>
         <pc:spChg chg="del">
           <ac:chgData name="Mariia Timofeeva" userId="ed2f9b69-3ae3-4a8a-85d4-5441ebde9499" providerId="ADAL" clId="{791D3311-16D3-4E4A-BD16-534F49491870}" dt="2025-09-14T11:08:25.786" v="1022" actId="478"/>
           <ac:spMkLst>
@@ -1277,7 +1053,7 @@
           </ac:spMkLst>
         </pc:spChg>
         <pc:spChg chg="add mod">
-          <ac:chgData name="Mariia Timofeeva" userId="ed2f9b69-3ae3-4a8a-85d4-5441ebde9499" providerId="ADAL" clId="{791D3311-16D3-4E4A-BD16-534F49491870}" dt="2025-09-14T11:09:18.651" v="1063" actId="14100"/>
+          <ac:chgData name="Mariia Timofeeva" userId="ed2f9b69-3ae3-4a8a-85d4-5441ebde9499" providerId="ADAL" clId="{791D3311-16D3-4E4A-BD16-534F49491870}" dt="2025-09-15T12:07:56.463" v="1943" actId="1076"/>
           <ac:spMkLst>
             <pc:docMk/>
             <pc:sldMk cId="741178744" sldId="265"/>
@@ -1285,6 +1061,14 @@
           </ac:spMkLst>
         </pc:spChg>
         <pc:spChg chg="add mod">
+          <ac:chgData name="Mariia Timofeeva" userId="ed2f9b69-3ae3-4a8a-85d4-5441ebde9499" providerId="ADAL" clId="{791D3311-16D3-4E4A-BD16-534F49491870}" dt="2025-09-15T12:07:53.285" v="1942" actId="1076"/>
+          <ac:spMkLst>
+            <pc:docMk/>
+            <pc:sldMk cId="741178744" sldId="265"/>
+            <ac:spMk id="9" creationId="{A0116514-E73A-DFA8-7776-8F77B0F94A92}"/>
+          </ac:spMkLst>
+        </pc:spChg>
+        <pc:spChg chg="add mod">
           <ac:chgData name="Mariia Timofeeva" userId="ed2f9b69-3ae3-4a8a-85d4-5441ebde9499" providerId="ADAL" clId="{791D3311-16D3-4E4A-BD16-534F49491870}" dt="2025-09-14T11:13:34.655" v="1114" actId="1076"/>
           <ac:spMkLst>
             <pc:docMk/>
@@ -1293,7 +1077,7 @@
           </ac:spMkLst>
         </pc:spChg>
         <pc:picChg chg="add mod modCrop">
-          <ac:chgData name="Mariia Timofeeva" userId="ed2f9b69-3ae3-4a8a-85d4-5441ebde9499" providerId="ADAL" clId="{791D3311-16D3-4E4A-BD16-534F49491870}" dt="2025-09-14T11:13:31.848" v="1113" actId="1076"/>
+          <ac:chgData name="Mariia Timofeeva" userId="ed2f9b69-3ae3-4a8a-85d4-5441ebde9499" providerId="ADAL" clId="{791D3311-16D3-4E4A-BD16-534F49491870}" dt="2025-09-15T12:07:05.556" v="1905" actId="1076"/>
           <ac:picMkLst>
             <pc:docMk/>
             <pc:sldMk cId="741178744" sldId="265"/>
@@ -1445,7 +1229,7 @@
           <a:p>
             <a:fld id="{99E4B094-8EFF-4B3A-9BA7-D5E4BE9B3DD4}" type="datetimeFigureOut">
               <a:rPr lang="en-AU" smtClean="0"/>
-              <a:t>14/09/2025</a:t>
+              <a:t>15/09/2025</a:t>
             </a:fld>
             <a:endParaRPr lang="en-AU"/>
           </a:p>
@@ -1891,7 +1675,7 @@
           <a:p>
             <a:fld id="{C3C93A44-3B84-481D-8C90-D903D3016914}" type="slidenum">
               <a:rPr lang="en-AU" smtClean="0"/>
-              <a:t>5</a:t>
+              <a:t>4</a:t>
             </a:fld>
             <a:endParaRPr lang="en-AU"/>
           </a:p>
@@ -3288,43 +3072,6 @@
           <a:chExt cx="0" cy="0"/>
         </a:xfrm>
       </p:grpSpPr>
-      <p:pic>
-        <p:nvPicPr>
-          <p:cNvPr id="7" name="Picture 6" descr="A graph with green squares&#10;&#10;AI-generated content may be incorrect.">
-            <a:extLst>
-              <a:ext uri="{FF2B5EF4-FFF2-40B4-BE49-F238E27FC236}">
-                <a16:creationId xmlns:a16="http://schemas.microsoft.com/office/drawing/2014/main" id="{034AB731-85B7-A1CA-3CC0-A8579066C4B4}"/>
-              </a:ext>
-            </a:extLst>
-          </p:cNvPr>
-          <p:cNvPicPr>
-            <a:picLocks noChangeAspect="1"/>
-          </p:cNvPicPr>
-          <p:nvPr/>
-        </p:nvPicPr>
-        <p:blipFill>
-          <a:blip r:embed="rId3">
-            <a:extLst>
-              <a:ext uri="{28A0092B-C50C-407E-A947-70E740481C1C}">
-                <a14:useLocalDpi xmlns:a14="http://schemas.microsoft.com/office/drawing/2010/main" val="0"/>
-              </a:ext>
-            </a:extLst>
-          </a:blip>
-          <a:srcRect b="5888"/>
-          <a:stretch>
-            <a:fillRect/>
-          </a:stretch>
-        </p:blipFill>
-        <p:spPr>
-          <a:xfrm>
-            <a:off x="6389659" y="289606"/>
-            <a:ext cx="5559662" cy="3139394"/>
-          </a:xfrm>
-          <a:prstGeom prst="rect">
-            <a:avLst/>
-          </a:prstGeom>
-        </p:spPr>
-      </p:pic>
       <p:sp>
         <p:nvSpPr>
           <p:cNvPr id="4" name="TextBox 3">
@@ -3377,53 +3124,162 @@
           </a:p>
         </p:txBody>
       </p:sp>
-      <p:sp>
-        <p:nvSpPr>
-          <p:cNvPr id="9" name="TextBox 8">
-            <a:extLst>
-              <a:ext uri="{FF2B5EF4-FFF2-40B4-BE49-F238E27FC236}">
-                <a16:creationId xmlns:a16="http://schemas.microsoft.com/office/drawing/2014/main" id="{CD650279-2151-6785-A789-870D312544A0}"/>
-              </a:ext>
-            </a:extLst>
-          </p:cNvPr>
-          <p:cNvSpPr txBox="1"/>
+      <p:grpSp>
+        <p:nvGrpSpPr>
+          <p:cNvPr id="5" name="Group 4">
+            <a:extLst>
+              <a:ext uri="{FF2B5EF4-FFF2-40B4-BE49-F238E27FC236}">
+                <a16:creationId xmlns:a16="http://schemas.microsoft.com/office/drawing/2014/main" id="{0A565874-E1E5-15BF-9538-0C3DDF80FB5B}"/>
+              </a:ext>
+            </a:extLst>
+          </p:cNvPr>
+          <p:cNvGrpSpPr/>
           <p:nvPr/>
-        </p:nvSpPr>
-        <p:spPr>
-          <a:xfrm>
-            <a:off x="242679" y="1675779"/>
-            <a:ext cx="6094926" cy="810478"/>
-          </a:xfrm>
-          <a:prstGeom prst="rect">
-            <a:avLst/>
-          </a:prstGeom>
-          <a:noFill/>
-        </p:spPr>
-        <p:txBody>
-          <a:bodyPr wrap="square">
-            <a:spAutoFit/>
-          </a:bodyPr>
-          <a:lstStyle/>
-          <a:p>
-            <a:pPr marL="342900" marR="0" lvl="0" indent="-342900" algn="just" defTabSz="914400" rtl="0" eaLnBrk="1" fontAlgn="auto" latinLnBrk="0" hangingPunct="1">
-              <a:lnSpc>
-                <a:spcPts val="2400"/>
-              </a:lnSpc>
-              <a:spcBef>
-                <a:spcPts val="0"/>
-              </a:spcBef>
-              <a:spcAft>
-                <a:spcPts val="800"/>
-              </a:spcAft>
-              <a:buClrTx/>
-              <a:buSzTx/>
-              <a:buFont typeface="Symbol" panose="05050102010706020507" pitchFamily="18" charset="2"/>
-              <a:buChar char=""/>
-              <a:tabLst/>
-              <a:defRPr/>
-            </a:pPr>
-            <a:r>
-              <a:rPr kumimoji="0" lang="en-AU" sz="2000" b="0" i="0" u="none" strike="noStrike" kern="100" cap="none" spc="0" normalizeH="0" baseline="0" noProof="0" dirty="0">
+        </p:nvGrpSpPr>
+        <p:grpSpPr>
+          <a:xfrm>
+            <a:off x="242679" y="289606"/>
+            <a:ext cx="11706642" cy="3139394"/>
+            <a:chOff x="242679" y="289606"/>
+            <a:chExt cx="11706642" cy="3139394"/>
+          </a:xfrm>
+        </p:grpSpPr>
+        <p:pic>
+          <p:nvPicPr>
+            <p:cNvPr id="7" name="Picture 6" descr="A graph with green squares&#10;&#10;AI-generated content may be incorrect.">
+              <a:extLst>
+                <a:ext uri="{FF2B5EF4-FFF2-40B4-BE49-F238E27FC236}">
+                  <a16:creationId xmlns:a16="http://schemas.microsoft.com/office/drawing/2014/main" id="{034AB731-85B7-A1CA-3CC0-A8579066C4B4}"/>
+                </a:ext>
+              </a:extLst>
+            </p:cNvPr>
+            <p:cNvPicPr>
+              <a:picLocks noChangeAspect="1"/>
+            </p:cNvPicPr>
+            <p:nvPr/>
+          </p:nvPicPr>
+          <p:blipFill>
+            <a:blip r:embed="rId3">
+              <a:extLst>
+                <a:ext uri="{28A0092B-C50C-407E-A947-70E740481C1C}">
+                  <a14:useLocalDpi xmlns:a14="http://schemas.microsoft.com/office/drawing/2010/main" val="0"/>
+                </a:ext>
+              </a:extLst>
+            </a:blip>
+            <a:srcRect b="5888"/>
+            <a:stretch>
+              <a:fillRect/>
+            </a:stretch>
+          </p:blipFill>
+          <p:spPr>
+            <a:xfrm>
+              <a:off x="6389659" y="289606"/>
+              <a:ext cx="5559662" cy="3139394"/>
+            </a:xfrm>
+            <a:prstGeom prst="rect">
+              <a:avLst/>
+            </a:prstGeom>
+          </p:spPr>
+        </p:pic>
+        <p:sp>
+          <p:nvSpPr>
+            <p:cNvPr id="9" name="TextBox 8">
+              <a:extLst>
+                <a:ext uri="{FF2B5EF4-FFF2-40B4-BE49-F238E27FC236}">
+                  <a16:creationId xmlns:a16="http://schemas.microsoft.com/office/drawing/2014/main" id="{CD650279-2151-6785-A789-870D312544A0}"/>
+                </a:ext>
+              </a:extLst>
+            </p:cNvPr>
+            <p:cNvSpPr txBox="1"/>
+            <p:nvPr/>
+          </p:nvSpPr>
+          <p:spPr>
+            <a:xfrm>
+              <a:off x="242679" y="1675779"/>
+              <a:ext cx="6094926" cy="810478"/>
+            </a:xfrm>
+            <a:prstGeom prst="rect">
+              <a:avLst/>
+            </a:prstGeom>
+            <a:noFill/>
+          </p:spPr>
+          <p:txBody>
+            <a:bodyPr wrap="square">
+              <a:spAutoFit/>
+            </a:bodyPr>
+            <a:lstStyle/>
+            <a:p>
+              <a:pPr marL="342900" marR="0" lvl="0" indent="-342900" algn="just" defTabSz="914400" rtl="0" eaLnBrk="1" fontAlgn="auto" latinLnBrk="0" hangingPunct="1">
+                <a:lnSpc>
+                  <a:spcPts val="2400"/>
+                </a:lnSpc>
+                <a:spcBef>
+                  <a:spcPts val="0"/>
+                </a:spcBef>
+                <a:spcAft>
+                  <a:spcPts val="800"/>
+                </a:spcAft>
+                <a:buClrTx/>
+                <a:buSzTx/>
+                <a:buFont typeface="Symbol" panose="05050102010706020507" pitchFamily="18" charset="2"/>
+                <a:buChar char=""/>
+                <a:tabLst/>
+                <a:defRPr/>
+              </a:pPr>
+              <a:r>
+                <a:rPr kumimoji="0" lang="en-AU" sz="2000" b="0" i="0" u="none" strike="noStrike" kern="100" cap="none" spc="0" normalizeH="0" baseline="0" noProof="0" dirty="0">
+                  <a:ln>
+                    <a:noFill/>
+                  </a:ln>
+                  <a:solidFill>
+                    <a:prstClr val="black"/>
+                  </a:solidFill>
+                  <a:effectLst/>
+                  <a:uLnTx/>
+                  <a:uFillTx/>
+                  <a:latin typeface="Times New Roman" panose="02020603050405020304" pitchFamily="18" charset="0"/>
+                  <a:ea typeface="Aptos" panose="020B0004020202020204" pitchFamily="34" charset="0"/>
+                  <a:cs typeface="Times New Roman" panose="02020603050405020304" pitchFamily="18" charset="0"/>
+                </a:rPr>
+                <a:t>The labelled dataset is limited (10%) and skewed </a:t>
+              </a:r>
+            </a:p>
+            <a:p>
+              <a:pPr marL="0" marR="0" lvl="0" indent="0" algn="just" defTabSz="914400" rtl="0" eaLnBrk="1" fontAlgn="auto" latinLnBrk="0" hangingPunct="1">
+                <a:lnSpc>
+                  <a:spcPts val="2400"/>
+                </a:lnSpc>
+                <a:spcBef>
+                  <a:spcPts val="0"/>
+                </a:spcBef>
+                <a:spcAft>
+                  <a:spcPts val="800"/>
+                </a:spcAft>
+                <a:buClrTx/>
+                <a:buSzTx/>
+                <a:buFontTx/>
+                <a:buNone/>
+                <a:tabLst/>
+                <a:defRPr/>
+              </a:pPr>
+              <a:r>
+                <a:rPr kumimoji="0" lang="en-AU" sz="2000" b="0" i="0" u="none" strike="noStrike" kern="100" cap="none" spc="0" normalizeH="0" baseline="0" noProof="0" dirty="0">
+                  <a:ln>
+                    <a:noFill/>
+                  </a:ln>
+                  <a:solidFill>
+                    <a:prstClr val="black"/>
+                  </a:solidFill>
+                  <a:effectLst/>
+                  <a:uLnTx/>
+                  <a:uFillTx/>
+                  <a:latin typeface="Times New Roman" panose="02020603050405020304" pitchFamily="18" charset="0"/>
+                  <a:ea typeface="Aptos" panose="020B0004020202020204" pitchFamily="34" charset="0"/>
+                  <a:cs typeface="Times New Roman" panose="02020603050405020304" pitchFamily="18" charset="0"/>
+                </a:rPr>
+                <a:t>towards the "Chocolate" class.</a:t>
+              </a:r>
+              <a:endParaRPr kumimoji="0" lang="en-AU" sz="1800" b="0" i="0" u="none" strike="noStrike" kern="100" cap="none" spc="0" normalizeH="0" baseline="0" noProof="0" dirty="0">
                 <a:ln>
                   <a:noFill/>
                 </a:ln>
@@ -3433,65 +3289,14 @@
                 <a:effectLst/>
                 <a:uLnTx/>
                 <a:uFillTx/>
-                <a:latin typeface="Times New Roman" panose="02020603050405020304" pitchFamily="18" charset="0"/>
+                <a:latin typeface="Aptos" panose="020B0004020202020204" pitchFamily="34" charset="0"/>
                 <a:ea typeface="Aptos" panose="020B0004020202020204" pitchFamily="34" charset="0"/>
                 <a:cs typeface="Times New Roman" panose="02020603050405020304" pitchFamily="18" charset="0"/>
-              </a:rPr>
-              <a:t>The labelled dataset is limited (10%) and skewed </a:t>
-            </a:r>
-          </a:p>
-          <a:p>
-            <a:pPr marL="0" marR="0" lvl="0" indent="0" algn="just" defTabSz="914400" rtl="0" eaLnBrk="1" fontAlgn="auto" latinLnBrk="0" hangingPunct="1">
-              <a:lnSpc>
-                <a:spcPts val="2400"/>
-              </a:lnSpc>
-              <a:spcBef>
-                <a:spcPts val="0"/>
-              </a:spcBef>
-              <a:spcAft>
-                <a:spcPts val="800"/>
-              </a:spcAft>
-              <a:buClrTx/>
-              <a:buSzTx/>
-              <a:buFontTx/>
-              <a:buNone/>
-              <a:tabLst/>
-              <a:defRPr/>
-            </a:pPr>
-            <a:r>
-              <a:rPr kumimoji="0" lang="en-AU" sz="2000" b="0" i="0" u="none" strike="noStrike" kern="100" cap="none" spc="0" normalizeH="0" baseline="0" noProof="0" dirty="0">
-                <a:ln>
-                  <a:noFill/>
-                </a:ln>
-                <a:solidFill>
-                  <a:prstClr val="black"/>
-                </a:solidFill>
-                <a:effectLst/>
-                <a:uLnTx/>
-                <a:uFillTx/>
-                <a:latin typeface="Times New Roman" panose="02020603050405020304" pitchFamily="18" charset="0"/>
-                <a:ea typeface="Aptos" panose="020B0004020202020204" pitchFamily="34" charset="0"/>
-                <a:cs typeface="Times New Roman" panose="02020603050405020304" pitchFamily="18" charset="0"/>
-              </a:rPr>
-              <a:t>towards the "Chocolate" class.</a:t>
-            </a:r>
-            <a:endParaRPr kumimoji="0" lang="en-AU" sz="1800" b="0" i="0" u="none" strike="noStrike" kern="100" cap="none" spc="0" normalizeH="0" baseline="0" noProof="0" dirty="0">
-              <a:ln>
-                <a:noFill/>
-              </a:ln>
-              <a:solidFill>
-                <a:prstClr val="black"/>
-              </a:solidFill>
-              <a:effectLst/>
-              <a:uLnTx/>
-              <a:uFillTx/>
-              <a:latin typeface="Aptos" panose="020B0004020202020204" pitchFamily="34" charset="0"/>
-              <a:ea typeface="Aptos" panose="020B0004020202020204" pitchFamily="34" charset="0"/>
-              <a:cs typeface="Times New Roman" panose="02020603050405020304" pitchFamily="18" charset="0"/>
-            </a:endParaRPr>
-          </a:p>
-        </p:txBody>
-      </p:sp>
+              </a:endParaRPr>
+            </a:p>
+          </p:txBody>
+        </p:sp>
+      </p:grpSp>
       <p:sp>
         <p:nvSpPr>
           <p:cNvPr id="11" name="TextBox 10">
@@ -3665,7 +3470,7 @@
                 <a:ea typeface="Aptos" panose="020B0004020202020204" pitchFamily="34" charset="0"/>
                 <a:cs typeface="Times New Roman" panose="02020603050405020304" pitchFamily="18" charset="0"/>
               </a:rPr>
-              <a:t>Over 1% of records show the first bet occurring before registration (potential data quality issue).</a:t>
+              <a:t>Over 1% of records show the first bet occurring before registration.</a:t>
             </a:r>
             <a:endParaRPr kumimoji="0" lang="en-AU" sz="1800" b="0" i="0" u="none" strike="noStrike" kern="100" cap="none" spc="0" normalizeH="0" baseline="0" noProof="0" dirty="0">
               <a:ln>
@@ -3699,7 +3504,7 @@
         <p:spPr>
           <a:xfrm>
             <a:off x="253406" y="5099606"/>
-            <a:ext cx="6094926" cy="960328"/>
+            <a:ext cx="6094926" cy="498663"/>
           </a:xfrm>
           <a:prstGeom prst="rect">
             <a:avLst/>
@@ -3744,7 +3549,7 @@
                 <a:ea typeface="Aptos" panose="020B0004020202020204" pitchFamily="34" charset="0"/>
                 <a:cs typeface="+mn-cs"/>
               </a:rPr>
-              <a:t>Three distinct peaks in registrations were observed (likely corresponding to major sporting events).</a:t>
+              <a:t>Three distinct peaks in registrations were observed.</a:t>
             </a:r>
             <a:endParaRPr kumimoji="0" lang="en-AU" sz="2000" b="0" i="0" u="none" strike="noStrike" kern="1200" cap="none" spc="0" normalizeH="0" baseline="0" noProof="0" dirty="0">
               <a:ln>
@@ -3763,12 +3568,60 @@
           </a:p>
         </p:txBody>
       </p:sp>
+      <p:sp>
+        <p:nvSpPr>
+          <p:cNvPr id="2" name="TextBox 1">
+            <a:extLst>
+              <a:ext uri="{FF2B5EF4-FFF2-40B4-BE49-F238E27FC236}">
+                <a16:creationId xmlns:a16="http://schemas.microsoft.com/office/drawing/2014/main" id="{1AD52D62-B718-EB55-BCC8-61C7CB06552A}"/>
+              </a:ext>
+            </a:extLst>
+          </p:cNvPr>
+          <p:cNvSpPr txBox="1"/>
+          <p:nvPr/>
+        </p:nvSpPr>
+        <p:spPr>
+          <a:xfrm>
+            <a:off x="242679" y="5826573"/>
+            <a:ext cx="6094926" cy="707886"/>
+          </a:xfrm>
+          <a:prstGeom prst="rect">
+            <a:avLst/>
+          </a:prstGeom>
+          <a:noFill/>
+        </p:spPr>
+        <p:txBody>
+          <a:bodyPr wrap="square">
+            <a:spAutoFit/>
+          </a:bodyPr>
+          <a:lstStyle/>
+          <a:p>
+            <a:pPr marL="342900" lvl="0" indent="-342900" algn="just">
+              <a:lnSpc>
+                <a:spcPts val="2400"/>
+              </a:lnSpc>
+              <a:buFont typeface="Symbol" panose="05050102010706020507" pitchFamily="18" charset="2"/>
+              <a:buChar char=""/>
+              <a:defRPr/>
+            </a:pPr>
+            <a:r>
+              <a:rPr lang="en-AU" sz="2000" dirty="0">
+                <a:solidFill>
+                  <a:prstClr val="black"/>
+                </a:solidFill>
+                <a:latin typeface="Times New Roman" panose="02020603050405020304" pitchFamily="18" charset="0"/>
+              </a:rPr>
+              <a:t>The labelled data distribution is similar to the full dataset distribution.</a:t>
+            </a:r>
+          </a:p>
+        </p:txBody>
+      </p:sp>
       <p:pic>
         <p:nvPicPr>
-          <p:cNvPr id="17" name="Picture 16" descr="A graph showing a number of data&#10;&#10;AI-generated content may be incorrect.">
-            <a:extLst>
-              <a:ext uri="{FF2B5EF4-FFF2-40B4-BE49-F238E27FC236}">
-                <a16:creationId xmlns:a16="http://schemas.microsoft.com/office/drawing/2014/main" id="{FE701C8C-52DD-9394-C643-8E8839401F4C}"/>
+          <p:cNvPr id="8" name="Picture 7" descr="A graph showing a number of data&#10;&#10;AI-generated content may be incorrect.">
+            <a:extLst>
+              <a:ext uri="{FF2B5EF4-FFF2-40B4-BE49-F238E27FC236}">
+                <a16:creationId xmlns:a16="http://schemas.microsoft.com/office/drawing/2014/main" id="{5DA8D231-734C-7864-49AC-E7E6F2A88A4A}"/>
               </a:ext>
             </a:extLst>
           </p:cNvPr>
@@ -3791,8 +3644,8 @@
         </p:blipFill>
         <p:spPr>
           <a:xfrm>
-            <a:off x="6348332" y="3429000"/>
-            <a:ext cx="5629150" cy="3377490"/>
+            <a:off x="6389658" y="3428999"/>
+            <a:ext cx="5586211" cy="3351727"/>
           </a:xfrm>
           <a:prstGeom prst="rect">
             <a:avLst/>
@@ -3809,6 +3662,307 @@
   <p:clrMapOvr>
     <a:masterClrMapping/>
   </p:clrMapOvr>
+  <p:timing>
+    <p:tnLst>
+      <p:par>
+        <p:cTn id="1" dur="indefinite" restart="never" nodeType="tmRoot">
+          <p:childTnLst>
+            <p:seq concurrent="1" nextAc="seek">
+              <p:cTn id="2" dur="indefinite" nodeType="mainSeq">
+                <p:childTnLst>
+                  <p:par>
+                    <p:cTn id="3" fill="hold">
+                      <p:stCondLst>
+                        <p:cond delay="indefinite"/>
+                      </p:stCondLst>
+                      <p:childTnLst>
+                        <p:par>
+                          <p:cTn id="4" fill="hold">
+                            <p:stCondLst>
+                              <p:cond delay="0"/>
+                            </p:stCondLst>
+                            <p:childTnLst>
+                              <p:par>
+                                <p:cTn id="5" presetID="10" presetClass="entr" presetSubtype="0" fill="hold" nodeType="clickEffect">
+                                  <p:stCondLst>
+                                    <p:cond delay="0"/>
+                                  </p:stCondLst>
+                                  <p:childTnLst>
+                                    <p:set>
+                                      <p:cBhvr>
+                                        <p:cTn id="6" dur="1" fill="hold">
+                                          <p:stCondLst>
+                                            <p:cond delay="0"/>
+                                          </p:stCondLst>
+                                        </p:cTn>
+                                        <p:tgtEl>
+                                          <p:spTgt spid="5"/>
+                                        </p:tgtEl>
+                                        <p:attrNameLst>
+                                          <p:attrName>style.visibility</p:attrName>
+                                        </p:attrNameLst>
+                                      </p:cBhvr>
+                                      <p:to>
+                                        <p:strVal val="visible"/>
+                                      </p:to>
+                                    </p:set>
+                                    <p:animEffect transition="in" filter="fade">
+                                      <p:cBhvr>
+                                        <p:cTn id="7" dur="500"/>
+                                        <p:tgtEl>
+                                          <p:spTgt spid="5"/>
+                                        </p:tgtEl>
+                                      </p:cBhvr>
+                                    </p:animEffect>
+                                  </p:childTnLst>
+                                </p:cTn>
+                              </p:par>
+                            </p:childTnLst>
+                          </p:cTn>
+                        </p:par>
+                      </p:childTnLst>
+                    </p:cTn>
+                  </p:par>
+                  <p:par>
+                    <p:cTn id="8" fill="hold">
+                      <p:stCondLst>
+                        <p:cond delay="indefinite"/>
+                      </p:stCondLst>
+                      <p:childTnLst>
+                        <p:par>
+                          <p:cTn id="9" fill="hold">
+                            <p:stCondLst>
+                              <p:cond delay="0"/>
+                            </p:stCondLst>
+                            <p:childTnLst>
+                              <p:par>
+                                <p:cTn id="10" presetID="10" presetClass="entr" presetSubtype="0" fill="hold" grpId="0" nodeType="clickEffect">
+                                  <p:stCondLst>
+                                    <p:cond delay="0"/>
+                                  </p:stCondLst>
+                                  <p:childTnLst>
+                                    <p:set>
+                                      <p:cBhvr>
+                                        <p:cTn id="11" dur="1" fill="hold">
+                                          <p:stCondLst>
+                                            <p:cond delay="0"/>
+                                          </p:stCondLst>
+                                        </p:cTn>
+                                        <p:tgtEl>
+                                          <p:spTgt spid="11"/>
+                                        </p:tgtEl>
+                                        <p:attrNameLst>
+                                          <p:attrName>style.visibility</p:attrName>
+                                        </p:attrNameLst>
+                                      </p:cBhvr>
+                                      <p:to>
+                                        <p:strVal val="visible"/>
+                                      </p:to>
+                                    </p:set>
+                                    <p:animEffect transition="in" filter="fade">
+                                      <p:cBhvr>
+                                        <p:cTn id="12" dur="500"/>
+                                        <p:tgtEl>
+                                          <p:spTgt spid="11"/>
+                                        </p:tgtEl>
+                                      </p:cBhvr>
+                                    </p:animEffect>
+                                  </p:childTnLst>
+                                </p:cTn>
+                              </p:par>
+                            </p:childTnLst>
+                          </p:cTn>
+                        </p:par>
+                      </p:childTnLst>
+                    </p:cTn>
+                  </p:par>
+                  <p:par>
+                    <p:cTn id="13" fill="hold">
+                      <p:stCondLst>
+                        <p:cond delay="indefinite"/>
+                      </p:stCondLst>
+                      <p:childTnLst>
+                        <p:par>
+                          <p:cTn id="14" fill="hold">
+                            <p:stCondLst>
+                              <p:cond delay="0"/>
+                            </p:stCondLst>
+                            <p:childTnLst>
+                              <p:par>
+                                <p:cTn id="15" presetID="10" presetClass="entr" presetSubtype="0" fill="hold" grpId="0" nodeType="clickEffect">
+                                  <p:stCondLst>
+                                    <p:cond delay="0"/>
+                                  </p:stCondLst>
+                                  <p:childTnLst>
+                                    <p:set>
+                                      <p:cBhvr>
+                                        <p:cTn id="16" dur="1" fill="hold">
+                                          <p:stCondLst>
+                                            <p:cond delay="0"/>
+                                          </p:stCondLst>
+                                        </p:cTn>
+                                        <p:tgtEl>
+                                          <p:spTgt spid="13"/>
+                                        </p:tgtEl>
+                                        <p:attrNameLst>
+                                          <p:attrName>style.visibility</p:attrName>
+                                        </p:attrNameLst>
+                                      </p:cBhvr>
+                                      <p:to>
+                                        <p:strVal val="visible"/>
+                                      </p:to>
+                                    </p:set>
+                                    <p:animEffect transition="in" filter="fade">
+                                      <p:cBhvr>
+                                        <p:cTn id="17" dur="500"/>
+                                        <p:tgtEl>
+                                          <p:spTgt spid="13"/>
+                                        </p:tgtEl>
+                                      </p:cBhvr>
+                                    </p:animEffect>
+                                  </p:childTnLst>
+                                </p:cTn>
+                              </p:par>
+                            </p:childTnLst>
+                          </p:cTn>
+                        </p:par>
+                      </p:childTnLst>
+                    </p:cTn>
+                  </p:par>
+                  <p:par>
+                    <p:cTn id="18" fill="hold">
+                      <p:stCondLst>
+                        <p:cond delay="indefinite"/>
+                      </p:stCondLst>
+                      <p:childTnLst>
+                        <p:par>
+                          <p:cTn id="19" fill="hold">
+                            <p:stCondLst>
+                              <p:cond delay="0"/>
+                            </p:stCondLst>
+                            <p:childTnLst>
+                              <p:par>
+                                <p:cTn id="20" presetID="10" presetClass="entr" presetSubtype="0" fill="hold" grpId="0" nodeType="clickEffect">
+                                  <p:stCondLst>
+                                    <p:cond delay="0"/>
+                                  </p:stCondLst>
+                                  <p:childTnLst>
+                                    <p:set>
+                                      <p:cBhvr>
+                                        <p:cTn id="21" dur="1" fill="hold">
+                                          <p:stCondLst>
+                                            <p:cond delay="0"/>
+                                          </p:stCondLst>
+                                        </p:cTn>
+                                        <p:tgtEl>
+                                          <p:spTgt spid="15"/>
+                                        </p:tgtEl>
+                                        <p:attrNameLst>
+                                          <p:attrName>style.visibility</p:attrName>
+                                        </p:attrNameLst>
+                                      </p:cBhvr>
+                                      <p:to>
+                                        <p:strVal val="visible"/>
+                                      </p:to>
+                                    </p:set>
+                                    <p:animEffect transition="in" filter="fade">
+                                      <p:cBhvr>
+                                        <p:cTn id="22" dur="500"/>
+                                        <p:tgtEl>
+                                          <p:spTgt spid="15"/>
+                                        </p:tgtEl>
+                                      </p:cBhvr>
+                                    </p:animEffect>
+                                  </p:childTnLst>
+                                </p:cTn>
+                              </p:par>
+                            </p:childTnLst>
+                          </p:cTn>
+                        </p:par>
+                      </p:childTnLst>
+                    </p:cTn>
+                  </p:par>
+                  <p:par>
+                    <p:cTn id="23" fill="hold">
+                      <p:stCondLst>
+                        <p:cond delay="indefinite"/>
+                      </p:stCondLst>
+                      <p:childTnLst>
+                        <p:par>
+                          <p:cTn id="24" fill="hold">
+                            <p:stCondLst>
+                              <p:cond delay="0"/>
+                            </p:stCondLst>
+                            <p:childTnLst>
+                              <p:par>
+                                <p:cTn id="25" presetID="10" presetClass="entr" presetSubtype="0" fill="hold" grpId="0" nodeType="clickEffect">
+                                  <p:stCondLst>
+                                    <p:cond delay="0"/>
+                                  </p:stCondLst>
+                                  <p:childTnLst>
+                                    <p:set>
+                                      <p:cBhvr>
+                                        <p:cTn id="26" dur="1" fill="hold">
+                                          <p:stCondLst>
+                                            <p:cond delay="0"/>
+                                          </p:stCondLst>
+                                        </p:cTn>
+                                        <p:tgtEl>
+                                          <p:spTgt spid="2"/>
+                                        </p:tgtEl>
+                                        <p:attrNameLst>
+                                          <p:attrName>style.visibility</p:attrName>
+                                        </p:attrNameLst>
+                                      </p:cBhvr>
+                                      <p:to>
+                                        <p:strVal val="visible"/>
+                                      </p:to>
+                                    </p:set>
+                                    <p:animEffect transition="in" filter="fade">
+                                      <p:cBhvr>
+                                        <p:cTn id="27" dur="500"/>
+                                        <p:tgtEl>
+                                          <p:spTgt spid="2"/>
+                                        </p:tgtEl>
+                                      </p:cBhvr>
+                                    </p:animEffect>
+                                  </p:childTnLst>
+                                </p:cTn>
+                              </p:par>
+                            </p:childTnLst>
+                          </p:cTn>
+                        </p:par>
+                      </p:childTnLst>
+                    </p:cTn>
+                  </p:par>
+                </p:childTnLst>
+              </p:cTn>
+              <p:prevCondLst>
+                <p:cond evt="onPrev" delay="0">
+                  <p:tgtEl>
+                    <p:sldTgt/>
+                  </p:tgtEl>
+                </p:cond>
+              </p:prevCondLst>
+              <p:nextCondLst>
+                <p:cond evt="onNext" delay="0">
+                  <p:tgtEl>
+                    <p:sldTgt/>
+                  </p:tgtEl>
+                </p:cond>
+              </p:nextCondLst>
+            </p:seq>
+          </p:childTnLst>
+        </p:cTn>
+      </p:par>
+    </p:tnLst>
+    <p:bldLst>
+      <p:bldP spid="11" grpId="0"/>
+      <p:bldP spid="13" grpId="0"/>
+      <p:bldP spid="15" grpId="0"/>
+      <p:bldP spid="2" grpId="0"/>
+    </p:bldLst>
+  </p:timing>
 </p:sld>
 </file>
 
@@ -3831,10 +3985,10 @@
       </p:grpSpPr>
       <p:sp>
         <p:nvSpPr>
-          <p:cNvPr id="4" name="TextBox 3">
-            <a:extLst>
-              <a:ext uri="{FF2B5EF4-FFF2-40B4-BE49-F238E27FC236}">
-                <a16:creationId xmlns:a16="http://schemas.microsoft.com/office/drawing/2014/main" id="{F4918419-8C69-5315-83DA-63D71BBACE8B}"/>
+          <p:cNvPr id="5" name="TextBox 4">
+            <a:extLst>
+              <a:ext uri="{FF2B5EF4-FFF2-40B4-BE49-F238E27FC236}">
+                <a16:creationId xmlns:a16="http://schemas.microsoft.com/office/drawing/2014/main" id="{FA641203-4A44-B20B-9CCC-7A9D9A8EE539}"/>
               </a:ext>
             </a:extLst>
           </p:cNvPr>
@@ -3843,8 +3997,170 @@
         </p:nvSpPr>
         <p:spPr>
           <a:xfrm>
-            <a:off x="265627" y="2535680"/>
-            <a:ext cx="4666981" cy="660437"/>
+            <a:off x="375364" y="631290"/>
+            <a:ext cx="11080659" cy="4430957"/>
+          </a:xfrm>
+          <a:prstGeom prst="rect">
+            <a:avLst/>
+          </a:prstGeom>
+          <a:noFill/>
+        </p:spPr>
+        <p:txBody>
+          <a:bodyPr wrap="square">
+            <a:spAutoFit/>
+          </a:bodyPr>
+          <a:lstStyle/>
+          <a:p>
+            <a:pPr lvl="0" algn="just">
+              <a:lnSpc>
+                <a:spcPct val="150000"/>
+              </a:lnSpc>
+              <a:spcAft>
+                <a:spcPts val="800"/>
+              </a:spcAft>
+            </a:pPr>
+            <a:endParaRPr lang="en-AU" sz="2000" kern="100" dirty="0">
+              <a:solidFill>
+                <a:prstClr val="black"/>
+              </a:solidFill>
+              <a:latin typeface="Times New Roman" panose="02020603050405020304" pitchFamily="18" charset="0"/>
+              <a:cs typeface="Times New Roman" panose="02020603050405020304" pitchFamily="18" charset="0"/>
+            </a:endParaRPr>
+          </a:p>
+          <a:p>
+            <a:pPr marL="342900" lvl="0" indent="-342900" algn="just">
+              <a:lnSpc>
+                <a:spcPct val="250000"/>
+              </a:lnSpc>
+              <a:spcAft>
+                <a:spcPts val="800"/>
+              </a:spcAft>
+              <a:buFont typeface="Symbol" panose="05050102010706020507" pitchFamily="18" charset="2"/>
+              <a:buChar char=""/>
+            </a:pPr>
+            <a:r>
+              <a:rPr lang="en-AU" sz="2000" kern="100" dirty="0">
+                <a:solidFill>
+                  <a:prstClr val="black"/>
+                </a:solidFill>
+                <a:latin typeface="Times New Roman" panose="02020603050405020304" pitchFamily="18" charset="0"/>
+                <a:cs typeface="Times New Roman" panose="02020603050405020304" pitchFamily="18" charset="0"/>
+              </a:rPr>
+              <a:t>Sequential trees focus on misclassified examples (helping minority classes).</a:t>
+            </a:r>
+          </a:p>
+          <a:p>
+            <a:pPr marL="342900" lvl="0" indent="-342900" algn="just">
+              <a:lnSpc>
+                <a:spcPct val="250000"/>
+              </a:lnSpc>
+              <a:spcAft>
+                <a:spcPts val="800"/>
+              </a:spcAft>
+              <a:buFont typeface="Symbol" panose="05050102010706020507" pitchFamily="18" charset="2"/>
+              <a:buChar char=""/>
+            </a:pPr>
+            <a:r>
+              <a:rPr lang="en-AU" sz="2000" kern="100" dirty="0">
+                <a:solidFill>
+                  <a:prstClr val="black"/>
+                </a:solidFill>
+                <a:latin typeface="Times New Roman" panose="02020603050405020304" pitchFamily="18" charset="0"/>
+                <a:cs typeface="Times New Roman" panose="02020603050405020304" pitchFamily="18" charset="0"/>
+              </a:rPr>
+              <a:t> Supports categorical features natively (</a:t>
+            </a:r>
+            <a:r>
+              <a:rPr lang="en-AU" sz="2000" kern="100" dirty="0" err="1">
+                <a:solidFill>
+                  <a:prstClr val="black"/>
+                </a:solidFill>
+                <a:latin typeface="Times New Roman" panose="02020603050405020304" pitchFamily="18" charset="0"/>
+                <a:cs typeface="Times New Roman" panose="02020603050405020304" pitchFamily="18" charset="0"/>
+              </a:rPr>
+              <a:t>XGBoost</a:t>
+            </a:r>
+            <a:r>
+              <a:rPr lang="en-AU" sz="2000" kern="100" dirty="0">
+                <a:solidFill>
+                  <a:prstClr val="black"/>
+                </a:solidFill>
+                <a:latin typeface="Times New Roman" panose="02020603050405020304" pitchFamily="18" charset="0"/>
+                <a:cs typeface="Times New Roman" panose="02020603050405020304" pitchFamily="18" charset="0"/>
+              </a:rPr>
+              <a:t> ≥ 1.5). </a:t>
+            </a:r>
+          </a:p>
+          <a:p>
+            <a:pPr marL="342900" lvl="0" indent="-342900" algn="just">
+              <a:lnSpc>
+                <a:spcPct val="250000"/>
+              </a:lnSpc>
+              <a:spcAft>
+                <a:spcPts val="800"/>
+              </a:spcAft>
+              <a:buFont typeface="Symbol" panose="05050102010706020507" pitchFamily="18" charset="2"/>
+              <a:buChar char=""/>
+            </a:pPr>
+            <a:r>
+              <a:rPr lang="en-AU" sz="2000" kern="100" dirty="0">
+                <a:solidFill>
+                  <a:prstClr val="black"/>
+                </a:solidFill>
+                <a:latin typeface="Times New Roman" panose="02020603050405020304" pitchFamily="18" charset="0"/>
+                <a:cs typeface="Times New Roman" panose="02020603050405020304" pitchFamily="18" charset="0"/>
+              </a:rPr>
+              <a:t>No need for numerical feature scaling. </a:t>
+            </a:r>
+          </a:p>
+          <a:p>
+            <a:pPr marL="342900" lvl="0" indent="-342900" algn="just">
+              <a:lnSpc>
+                <a:spcPct val="250000"/>
+              </a:lnSpc>
+              <a:spcAft>
+                <a:spcPts val="800"/>
+              </a:spcAft>
+              <a:buFont typeface="Symbol" panose="05050102010706020507" pitchFamily="18" charset="2"/>
+              <a:buChar char=""/>
+            </a:pPr>
+            <a:r>
+              <a:rPr lang="en-AU" sz="2000" kern="100" dirty="0">
+                <a:solidFill>
+                  <a:prstClr val="black"/>
+                </a:solidFill>
+                <a:latin typeface="Times New Roman" panose="02020603050405020304" pitchFamily="18" charset="0"/>
+                <a:cs typeface="Times New Roman" panose="02020603050405020304" pitchFamily="18" charset="0"/>
+              </a:rPr>
+              <a:t>Nonlinear relationships.</a:t>
+            </a:r>
+          </a:p>
+          <a:p>
+            <a:pPr lvl="0" algn="just">
+              <a:lnSpc>
+                <a:spcPct val="107000"/>
+              </a:lnSpc>
+            </a:pPr>
+            <a:endParaRPr lang="en-AU" dirty="0"/>
+          </a:p>
+        </p:txBody>
+      </p:sp>
+      <p:sp>
+        <p:nvSpPr>
+          <p:cNvPr id="6" name="TextBox 5">
+            <a:extLst>
+              <a:ext uri="{FF2B5EF4-FFF2-40B4-BE49-F238E27FC236}">
+                <a16:creationId xmlns:a16="http://schemas.microsoft.com/office/drawing/2014/main" id="{0FB1C7E5-91AC-4F48-D4E3-FE2EE5C22634}"/>
+              </a:ext>
+            </a:extLst>
+          </p:cNvPr>
+          <p:cNvSpPr txBox="1"/>
+          <p:nvPr/>
+        </p:nvSpPr>
+        <p:spPr>
+          <a:xfrm>
+            <a:off x="375364" y="308734"/>
+            <a:ext cx="8884812" cy="645113"/>
           </a:xfrm>
           <a:prstGeom prst="rect">
             <a:avLst/>
@@ -3871,717 +4187,29 @@
                 <a:ea typeface="Aptos" panose="020B0004020202020204" pitchFamily="34" charset="0"/>
                 <a:cs typeface="Times New Roman" panose="02020603050405020304" pitchFamily="18" charset="0"/>
               </a:rPr>
-              <a:t>Simple model</a:t>
-            </a:r>
-            <a:endParaRPr lang="en-AU" sz="3600" kern="100" dirty="0">
-              <a:latin typeface="Aptos" panose="020B0004020202020204" pitchFamily="34" charset="0"/>
-              <a:ea typeface="Aptos" panose="020B0004020202020204" pitchFamily="34" charset="0"/>
-              <a:cs typeface="Times New Roman" panose="02020603050405020304" pitchFamily="18" charset="0"/>
-            </a:endParaRPr>
-          </a:p>
-        </p:txBody>
-      </p:sp>
-      <p:sp>
-        <p:nvSpPr>
-          <p:cNvPr id="5" name="TextBox 4">
-            <a:extLst>
-              <a:ext uri="{FF2B5EF4-FFF2-40B4-BE49-F238E27FC236}">
-                <a16:creationId xmlns:a16="http://schemas.microsoft.com/office/drawing/2014/main" id="{FFE36EAA-F03C-5E4F-A08D-D35741B0AF7B}"/>
-              </a:ext>
-            </a:extLst>
-          </p:cNvPr>
-          <p:cNvSpPr txBox="1"/>
-          <p:nvPr/>
-        </p:nvSpPr>
-        <p:spPr>
-          <a:xfrm>
-            <a:off x="265627" y="538521"/>
-            <a:ext cx="8884812" cy="645113"/>
-          </a:xfrm>
-          <a:prstGeom prst="rect">
-            <a:avLst/>
-          </a:prstGeom>
-          <a:noFill/>
-        </p:spPr>
-        <p:txBody>
-          <a:bodyPr wrap="square">
-            <a:spAutoFit/>
-          </a:bodyPr>
-          <a:lstStyle/>
-          <a:p>
-            <a:pPr>
-              <a:lnSpc>
-                <a:spcPct val="107000"/>
-              </a:lnSpc>
-              <a:spcAft>
-                <a:spcPts val="800"/>
-              </a:spcAft>
-            </a:pPr>
-            <a:r>
-              <a:rPr lang="en-AU" sz="3600" b="1" kern="100" dirty="0">
-                <a:latin typeface="Times New Roman" panose="02020603050405020304" pitchFamily="18" charset="0"/>
-                <a:ea typeface="Aptos" panose="020B0004020202020204" pitchFamily="34" charset="0"/>
-                <a:cs typeface="Times New Roman" panose="02020603050405020304" pitchFamily="18" charset="0"/>
-              </a:rPr>
-              <a:t>Problem definition</a:t>
-            </a:r>
-            <a:endParaRPr lang="en-AU" sz="3600" b="1" kern="100" dirty="0">
-              <a:latin typeface="Times New Roman" panose="02020603050405020304" pitchFamily="18" charset="0"/>
-              <a:cs typeface="Times New Roman" panose="02020603050405020304" pitchFamily="18" charset="0"/>
-            </a:endParaRPr>
-          </a:p>
-        </p:txBody>
-      </p:sp>
-      <p:sp>
-        <p:nvSpPr>
-          <p:cNvPr id="9" name="TextBox 8">
-            <a:extLst>
-              <a:ext uri="{FF2B5EF4-FFF2-40B4-BE49-F238E27FC236}">
-                <a16:creationId xmlns:a16="http://schemas.microsoft.com/office/drawing/2014/main" id="{89FFD399-A011-FA09-20F5-9B35F88AF34E}"/>
-              </a:ext>
-            </a:extLst>
-          </p:cNvPr>
-          <p:cNvSpPr txBox="1"/>
-          <p:nvPr/>
-        </p:nvSpPr>
-        <p:spPr>
-          <a:xfrm>
-            <a:off x="265627" y="1241566"/>
-            <a:ext cx="11692407" cy="707886"/>
-          </a:xfrm>
-          <a:prstGeom prst="rect">
-            <a:avLst/>
-          </a:prstGeom>
-          <a:noFill/>
-        </p:spPr>
-        <p:txBody>
-          <a:bodyPr wrap="square">
-            <a:spAutoFit/>
-          </a:bodyPr>
-          <a:lstStyle/>
-          <a:p>
-            <a:r>
-              <a:rPr lang="en-AU" sz="2000" kern="100" dirty="0">
-                <a:solidFill>
-                  <a:prstClr val="black"/>
-                </a:solidFill>
-                <a:latin typeface="Times New Roman" panose="02020603050405020304" pitchFamily="18" charset="0"/>
-                <a:cs typeface="Times New Roman" panose="02020603050405020304" pitchFamily="18" charset="0"/>
-              </a:rPr>
-              <a:t>Building a multiclassification model to predict user survey responses (Chocolate/Strawberry/Vanilla) from sports betting user </a:t>
-            </a:r>
-            <a:r>
-              <a:rPr lang="en-AU" sz="2000" kern="100" dirty="0" err="1">
-                <a:solidFill>
-                  <a:prstClr val="black"/>
-                </a:solidFill>
-                <a:latin typeface="Times New Roman" panose="02020603050405020304" pitchFamily="18" charset="0"/>
-                <a:cs typeface="Times New Roman" panose="02020603050405020304" pitchFamily="18" charset="0"/>
-              </a:rPr>
-              <a:t>behavior</a:t>
-            </a:r>
-            <a:r>
-              <a:rPr lang="en-AU" sz="2000" kern="100" dirty="0">
-                <a:solidFill>
-                  <a:prstClr val="black"/>
-                </a:solidFill>
-                <a:latin typeface="Times New Roman" panose="02020603050405020304" pitchFamily="18" charset="0"/>
-                <a:cs typeface="Times New Roman" panose="02020603050405020304" pitchFamily="18" charset="0"/>
-              </a:rPr>
-              <a:t> data.</a:t>
-            </a:r>
-          </a:p>
-        </p:txBody>
-      </p:sp>
-      <p:sp>
-        <p:nvSpPr>
-          <p:cNvPr id="10" name="TextBox 9">
-            <a:extLst>
-              <a:ext uri="{FF2B5EF4-FFF2-40B4-BE49-F238E27FC236}">
-                <a16:creationId xmlns:a16="http://schemas.microsoft.com/office/drawing/2014/main" id="{9709729B-5093-893A-9A02-A98009DF7558}"/>
-              </a:ext>
-            </a:extLst>
-          </p:cNvPr>
-          <p:cNvSpPr txBox="1"/>
-          <p:nvPr/>
-        </p:nvSpPr>
-        <p:spPr>
-          <a:xfrm>
-            <a:off x="2346305" y="4100696"/>
-            <a:ext cx="1555995" cy="646331"/>
-          </a:xfrm>
-          <a:prstGeom prst="rect">
-            <a:avLst/>
-          </a:prstGeom>
-          <a:noFill/>
-          <a:ln w="25400">
-            <a:solidFill>
-              <a:schemeClr val="accent1">
-                <a:shade val="15000"/>
-              </a:schemeClr>
-            </a:solidFill>
-          </a:ln>
-        </p:spPr>
-        <p:txBody>
-          <a:bodyPr wrap="square" rtlCol="0">
-            <a:spAutoFit/>
-          </a:bodyPr>
-          <a:lstStyle/>
-          <a:p>
-            <a:pPr algn="ctr"/>
-            <a:r>
-              <a:rPr lang="en-AU" dirty="0">
-                <a:latin typeface="Times New Roman" panose="02020603050405020304" pitchFamily="18" charset="0"/>
-                <a:cs typeface="Times New Roman" panose="02020603050405020304" pitchFamily="18" charset="0"/>
-              </a:rPr>
-              <a:t>Labelled data</a:t>
-            </a:r>
-          </a:p>
-          <a:p>
-            <a:pPr algn="ctr"/>
-            <a:endParaRPr lang="en-AU" dirty="0"/>
-          </a:p>
-        </p:txBody>
-      </p:sp>
-      <p:sp>
-        <p:nvSpPr>
-          <p:cNvPr id="14" name="TextBox 13">
-            <a:extLst>
-              <a:ext uri="{FF2B5EF4-FFF2-40B4-BE49-F238E27FC236}">
-                <a16:creationId xmlns:a16="http://schemas.microsoft.com/office/drawing/2014/main" id="{8B3F216B-C978-CC52-0843-19C489D85697}"/>
-              </a:ext>
-            </a:extLst>
-          </p:cNvPr>
-          <p:cNvSpPr txBox="1"/>
-          <p:nvPr/>
-        </p:nvSpPr>
-        <p:spPr>
-          <a:xfrm>
-            <a:off x="405888" y="4100700"/>
-            <a:ext cx="1555995" cy="646331"/>
-          </a:xfrm>
-          <a:prstGeom prst="rect">
-            <a:avLst/>
-          </a:prstGeom>
-          <a:noFill/>
-          <a:ln w="25400">
-            <a:solidFill>
-              <a:schemeClr val="accent1">
-                <a:shade val="15000"/>
-              </a:schemeClr>
-            </a:solidFill>
-          </a:ln>
-        </p:spPr>
-        <p:txBody>
-          <a:bodyPr wrap="square" rtlCol="0">
-            <a:spAutoFit/>
-          </a:bodyPr>
-          <a:lstStyle/>
-          <a:p>
-            <a:pPr algn="ctr"/>
-            <a:r>
-              <a:rPr lang="en-AU" dirty="0">
-                <a:latin typeface="Times New Roman" panose="02020603050405020304" pitchFamily="18" charset="0"/>
-                <a:cs typeface="Times New Roman" panose="02020603050405020304" pitchFamily="18" charset="0"/>
-              </a:rPr>
-              <a:t>Data preprocessing </a:t>
-            </a:r>
-            <a:endParaRPr lang="en-AU" dirty="0"/>
-          </a:p>
-        </p:txBody>
-      </p:sp>
-      <p:sp>
-        <p:nvSpPr>
-          <p:cNvPr id="15" name="TextBox 14">
-            <a:extLst>
-              <a:ext uri="{FF2B5EF4-FFF2-40B4-BE49-F238E27FC236}">
-                <a16:creationId xmlns:a16="http://schemas.microsoft.com/office/drawing/2014/main" id="{5EEACE14-D276-3E56-44DF-367597C138F6}"/>
-              </a:ext>
-            </a:extLst>
-          </p:cNvPr>
-          <p:cNvSpPr txBox="1"/>
-          <p:nvPr/>
-        </p:nvSpPr>
-        <p:spPr>
-          <a:xfrm>
-            <a:off x="4286722" y="4105912"/>
-            <a:ext cx="1555995" cy="646331"/>
-          </a:xfrm>
-          <a:prstGeom prst="rect">
-            <a:avLst/>
-          </a:prstGeom>
-          <a:noFill/>
-          <a:ln w="25400">
-            <a:solidFill>
-              <a:schemeClr val="accent1">
-                <a:shade val="15000"/>
-              </a:schemeClr>
-            </a:solidFill>
-          </a:ln>
-        </p:spPr>
-        <p:txBody>
-          <a:bodyPr wrap="square" rtlCol="0">
-            <a:spAutoFit/>
-          </a:bodyPr>
-          <a:lstStyle/>
-          <a:p>
-            <a:pPr algn="ctr"/>
-            <a:r>
-              <a:rPr lang="en-AU" dirty="0">
-                <a:latin typeface="Times New Roman" panose="02020603050405020304" pitchFamily="18" charset="0"/>
-                <a:cs typeface="Times New Roman" panose="02020603050405020304" pitchFamily="18" charset="0"/>
-              </a:rPr>
-              <a:t>Training</a:t>
-            </a:r>
-          </a:p>
-          <a:p>
-            <a:pPr algn="ctr"/>
-            <a:endParaRPr lang="en-AU" dirty="0"/>
-          </a:p>
-        </p:txBody>
-      </p:sp>
-      <p:sp>
-        <p:nvSpPr>
-          <p:cNvPr id="16" name="TextBox 15">
-            <a:extLst>
-              <a:ext uri="{FF2B5EF4-FFF2-40B4-BE49-F238E27FC236}">
-                <a16:creationId xmlns:a16="http://schemas.microsoft.com/office/drawing/2014/main" id="{9A00B939-426F-0F06-D421-26C1190B6F6B}"/>
-              </a:ext>
-            </a:extLst>
-          </p:cNvPr>
-          <p:cNvSpPr txBox="1"/>
-          <p:nvPr/>
-        </p:nvSpPr>
-        <p:spPr>
-          <a:xfrm>
-            <a:off x="6227139" y="4112350"/>
-            <a:ext cx="1555995" cy="569387"/>
-          </a:xfrm>
-          <a:prstGeom prst="rect">
-            <a:avLst/>
-          </a:prstGeom>
-          <a:noFill/>
-          <a:ln w="25400">
-            <a:solidFill>
-              <a:schemeClr val="accent1">
-                <a:shade val="15000"/>
-              </a:schemeClr>
-            </a:solidFill>
-          </a:ln>
-        </p:spPr>
-        <p:txBody>
-          <a:bodyPr wrap="square" rtlCol="0">
-            <a:spAutoFit/>
-          </a:bodyPr>
-          <a:lstStyle/>
-          <a:p>
-            <a:pPr algn="ctr"/>
-            <a:r>
-              <a:rPr lang="en-AU" sz="1550" dirty="0">
-                <a:latin typeface="Times New Roman" panose="02020603050405020304" pitchFamily="18" charset="0"/>
-                <a:cs typeface="Times New Roman" panose="02020603050405020304" pitchFamily="18" charset="0"/>
-              </a:rPr>
-              <a:t>Validation on the validation set</a:t>
-            </a:r>
-          </a:p>
-        </p:txBody>
-      </p:sp>
-      <p:sp>
-        <p:nvSpPr>
-          <p:cNvPr id="17" name="TextBox 16">
-            <a:extLst>
-              <a:ext uri="{FF2B5EF4-FFF2-40B4-BE49-F238E27FC236}">
-                <a16:creationId xmlns:a16="http://schemas.microsoft.com/office/drawing/2014/main" id="{A0C4BF67-AECA-EF9A-26F5-B84EDCBC5B6D}"/>
-              </a:ext>
-            </a:extLst>
-          </p:cNvPr>
-          <p:cNvSpPr txBox="1"/>
-          <p:nvPr/>
-        </p:nvSpPr>
-        <p:spPr>
-          <a:xfrm>
-            <a:off x="8167556" y="4112350"/>
-            <a:ext cx="1555995" cy="646331"/>
-          </a:xfrm>
-          <a:prstGeom prst="rect">
-            <a:avLst/>
-          </a:prstGeom>
-          <a:noFill/>
-          <a:ln w="25400">
-            <a:solidFill>
-              <a:schemeClr val="accent1">
-                <a:shade val="15000"/>
-              </a:schemeClr>
-            </a:solidFill>
-          </a:ln>
-        </p:spPr>
-        <p:txBody>
-          <a:bodyPr wrap="square" rtlCol="0">
-            <a:spAutoFit/>
-          </a:bodyPr>
-          <a:lstStyle/>
-          <a:p>
-            <a:pPr algn="ctr"/>
-            <a:r>
-              <a:rPr lang="en-AU" dirty="0">
-                <a:latin typeface="Times New Roman" panose="02020603050405020304" pitchFamily="18" charset="0"/>
-                <a:cs typeface="Times New Roman" panose="02020603050405020304" pitchFamily="18" charset="0"/>
-              </a:rPr>
-              <a:t>Validation on the test set</a:t>
-            </a:r>
-          </a:p>
-        </p:txBody>
-      </p:sp>
-      <p:sp>
-        <p:nvSpPr>
-          <p:cNvPr id="23" name="TextBox 22">
-            <a:extLst>
-              <a:ext uri="{FF2B5EF4-FFF2-40B4-BE49-F238E27FC236}">
-                <a16:creationId xmlns:a16="http://schemas.microsoft.com/office/drawing/2014/main" id="{9A4D887B-FB56-B694-D2E8-5B9DC9D44A2B}"/>
-              </a:ext>
-            </a:extLst>
-          </p:cNvPr>
-          <p:cNvSpPr txBox="1"/>
-          <p:nvPr/>
-        </p:nvSpPr>
-        <p:spPr>
-          <a:xfrm>
-            <a:off x="10107973" y="4100695"/>
-            <a:ext cx="1555995" cy="646331"/>
-          </a:xfrm>
-          <a:prstGeom prst="rect">
-            <a:avLst/>
-          </a:prstGeom>
-          <a:noFill/>
-          <a:ln w="25400">
-            <a:solidFill>
-              <a:schemeClr val="accent1">
-                <a:shade val="15000"/>
-              </a:schemeClr>
-            </a:solidFill>
-          </a:ln>
-        </p:spPr>
-        <p:txBody>
-          <a:bodyPr wrap="square" rtlCol="0">
-            <a:spAutoFit/>
-          </a:bodyPr>
-          <a:lstStyle/>
-          <a:p>
-            <a:pPr algn="ctr"/>
-            <a:r>
-              <a:rPr lang="en-AU" dirty="0">
-                <a:latin typeface="Times New Roman" panose="02020603050405020304" pitchFamily="18" charset="0"/>
-                <a:cs typeface="Times New Roman" panose="02020603050405020304" pitchFamily="18" charset="0"/>
-              </a:rPr>
-              <a:t>Save the model</a:t>
-            </a:r>
-          </a:p>
-        </p:txBody>
-      </p:sp>
-      <p:sp>
-        <p:nvSpPr>
-          <p:cNvPr id="25" name="TextBox 24">
-            <a:extLst>
-              <a:ext uri="{FF2B5EF4-FFF2-40B4-BE49-F238E27FC236}">
-                <a16:creationId xmlns:a16="http://schemas.microsoft.com/office/drawing/2014/main" id="{189411FD-672D-0CD2-9E41-61F21DCF2FCE}"/>
-              </a:ext>
-            </a:extLst>
-          </p:cNvPr>
-          <p:cNvSpPr txBox="1"/>
-          <p:nvPr/>
-        </p:nvSpPr>
-        <p:spPr>
-          <a:xfrm>
-            <a:off x="2316152" y="4856579"/>
-            <a:ext cx="1616299" cy="523220"/>
-          </a:xfrm>
-          <a:prstGeom prst="rect">
-            <a:avLst/>
-          </a:prstGeom>
-          <a:noFill/>
-        </p:spPr>
-        <p:txBody>
-          <a:bodyPr wrap="square">
-            <a:spAutoFit/>
-          </a:bodyPr>
-          <a:lstStyle/>
-          <a:p>
-            <a:r>
-              <a:rPr lang="en-AU" sz="1400" dirty="0">
-                <a:latin typeface="Times New Roman" panose="02020603050405020304" pitchFamily="18" charset="0"/>
-                <a:cs typeface="Times New Roman" panose="02020603050405020304" pitchFamily="18" charset="0"/>
-              </a:rPr>
-              <a:t>train/validation/test = 70/10/20</a:t>
-            </a:r>
-          </a:p>
-        </p:txBody>
-      </p:sp>
-      <p:sp>
-        <p:nvSpPr>
-          <p:cNvPr id="26" name="TextBox 25">
-            <a:extLst>
-              <a:ext uri="{FF2B5EF4-FFF2-40B4-BE49-F238E27FC236}">
-                <a16:creationId xmlns:a16="http://schemas.microsoft.com/office/drawing/2014/main" id="{00B6F944-88E3-3B8A-6334-DBA079C06E86}"/>
-              </a:ext>
-            </a:extLst>
-          </p:cNvPr>
-          <p:cNvSpPr txBox="1"/>
-          <p:nvPr/>
-        </p:nvSpPr>
-        <p:spPr>
-          <a:xfrm>
-            <a:off x="4481849" y="4856579"/>
-            <a:ext cx="1360868" cy="307777"/>
-          </a:xfrm>
-          <a:prstGeom prst="rect">
-            <a:avLst/>
-          </a:prstGeom>
-          <a:noFill/>
-        </p:spPr>
-        <p:txBody>
-          <a:bodyPr wrap="square">
-            <a:spAutoFit/>
-          </a:bodyPr>
-          <a:lstStyle/>
-          <a:p>
-            <a:r>
-              <a:rPr lang="en-AU" sz="1400" dirty="0" err="1">
+              <a:t>Why </a:t>
+            </a:r>
+            <a:r>
+              <a:rPr lang="en-AU" sz="3600" b="1" kern="100" dirty="0" err="1">
                 <a:latin typeface="Times New Roman" panose="02020603050405020304" pitchFamily="18" charset="0"/>
                 <a:cs typeface="Times New Roman" panose="02020603050405020304" pitchFamily="18" charset="0"/>
               </a:rPr>
               <a:t>XGBClassifier</a:t>
             </a:r>
-            <a:endParaRPr lang="en-AU" sz="1400" dirty="0">
-              <a:latin typeface="Times New Roman" panose="02020603050405020304" pitchFamily="18" charset="0"/>
-              <a:cs typeface="Times New Roman" panose="02020603050405020304" pitchFamily="18" charset="0"/>
-            </a:endParaRPr>
+            <a:r>
+              <a:rPr lang="en-AU" sz="3600" b="1" kern="100" dirty="0">
+                <a:latin typeface="Times New Roman" panose="02020603050405020304" pitchFamily="18" charset="0"/>
+                <a:cs typeface="Times New Roman" panose="02020603050405020304" pitchFamily="18" charset="0"/>
+              </a:rPr>
+              <a:t>?</a:t>
+            </a:r>
           </a:p>
         </p:txBody>
       </p:sp>
-      <p:cxnSp>
-        <p:nvCxnSpPr>
-          <p:cNvPr id="28" name="Straight Arrow Connector 27">
-            <a:extLst>
-              <a:ext uri="{FF2B5EF4-FFF2-40B4-BE49-F238E27FC236}">
-                <a16:creationId xmlns:a16="http://schemas.microsoft.com/office/drawing/2014/main" id="{E10267CE-E720-B7A4-3D6A-F505204AA98F}"/>
-              </a:ext>
-            </a:extLst>
-          </p:cNvPr>
-          <p:cNvCxnSpPr>
-            <a:cxnSpLocks/>
-          </p:cNvCxnSpPr>
-          <p:nvPr/>
-        </p:nvCxnSpPr>
-        <p:spPr>
-          <a:xfrm>
-            <a:off x="2006959" y="4429480"/>
-            <a:ext cx="279041" cy="0"/>
-          </a:xfrm>
-          <a:prstGeom prst="straightConnector1">
-            <a:avLst/>
-          </a:prstGeom>
-          <a:ln>
-            <a:solidFill>
-              <a:schemeClr val="tx1"/>
-            </a:solidFill>
-            <a:tailEnd type="triangle"/>
-          </a:ln>
-        </p:spPr>
-        <p:style>
-          <a:lnRef idx="2">
-            <a:schemeClr val="accent1"/>
-          </a:lnRef>
-          <a:fillRef idx="0">
-            <a:schemeClr val="accent1"/>
-          </a:fillRef>
-          <a:effectRef idx="1">
-            <a:schemeClr val="accent1"/>
-          </a:effectRef>
-          <a:fontRef idx="minor">
-            <a:schemeClr val="tx1"/>
-          </a:fontRef>
-        </p:style>
-      </p:cxnSp>
-      <p:cxnSp>
-        <p:nvCxnSpPr>
-          <p:cNvPr id="32" name="Straight Arrow Connector 31">
-            <a:extLst>
-              <a:ext uri="{FF2B5EF4-FFF2-40B4-BE49-F238E27FC236}">
-                <a16:creationId xmlns:a16="http://schemas.microsoft.com/office/drawing/2014/main" id="{0C19A10D-4DE5-6A99-472E-958DAA36608F}"/>
-              </a:ext>
-            </a:extLst>
-          </p:cNvPr>
-          <p:cNvCxnSpPr>
-            <a:cxnSpLocks/>
-          </p:cNvCxnSpPr>
-          <p:nvPr/>
-        </p:nvCxnSpPr>
-        <p:spPr>
-          <a:xfrm>
-            <a:off x="3968841" y="4433773"/>
-            <a:ext cx="279041" cy="0"/>
-          </a:xfrm>
-          <a:prstGeom prst="straightConnector1">
-            <a:avLst/>
-          </a:prstGeom>
-          <a:ln>
-            <a:solidFill>
-              <a:schemeClr val="tx1"/>
-            </a:solidFill>
-            <a:tailEnd type="triangle"/>
-          </a:ln>
-        </p:spPr>
-        <p:style>
-          <a:lnRef idx="2">
-            <a:schemeClr val="accent1"/>
-          </a:lnRef>
-          <a:fillRef idx="0">
-            <a:schemeClr val="accent1"/>
-          </a:fillRef>
-          <a:effectRef idx="1">
-            <a:schemeClr val="accent1"/>
-          </a:effectRef>
-          <a:fontRef idx="minor">
-            <a:schemeClr val="tx1"/>
-          </a:fontRef>
-        </p:style>
-      </p:cxnSp>
-      <p:cxnSp>
-        <p:nvCxnSpPr>
-          <p:cNvPr id="33" name="Straight Arrow Connector 32">
-            <a:extLst>
-              <a:ext uri="{FF2B5EF4-FFF2-40B4-BE49-F238E27FC236}">
-                <a16:creationId xmlns:a16="http://schemas.microsoft.com/office/drawing/2014/main" id="{CB9C7B51-514A-007E-BB8C-7D2915E7FE36}"/>
-              </a:ext>
-            </a:extLst>
-          </p:cNvPr>
-          <p:cNvCxnSpPr>
-            <a:cxnSpLocks/>
-          </p:cNvCxnSpPr>
-          <p:nvPr/>
-        </p:nvCxnSpPr>
-        <p:spPr>
-          <a:xfrm>
-            <a:off x="5907111" y="4427333"/>
-            <a:ext cx="279041" cy="0"/>
-          </a:xfrm>
-          <a:prstGeom prst="straightConnector1">
-            <a:avLst/>
-          </a:prstGeom>
-          <a:ln>
-            <a:solidFill>
-              <a:schemeClr val="tx1"/>
-            </a:solidFill>
-            <a:tailEnd type="triangle"/>
-          </a:ln>
-        </p:spPr>
-        <p:style>
-          <a:lnRef idx="2">
-            <a:schemeClr val="accent1"/>
-          </a:lnRef>
-          <a:fillRef idx="0">
-            <a:schemeClr val="accent1"/>
-          </a:fillRef>
-          <a:effectRef idx="1">
-            <a:schemeClr val="accent1"/>
-          </a:effectRef>
-          <a:fontRef idx="minor">
-            <a:schemeClr val="tx1"/>
-          </a:fontRef>
-        </p:style>
-      </p:cxnSp>
-      <p:cxnSp>
-        <p:nvCxnSpPr>
-          <p:cNvPr id="34" name="Straight Arrow Connector 33">
-            <a:extLst>
-              <a:ext uri="{FF2B5EF4-FFF2-40B4-BE49-F238E27FC236}">
-                <a16:creationId xmlns:a16="http://schemas.microsoft.com/office/drawing/2014/main" id="{651A76DF-19C6-433D-B42A-16584469E319}"/>
-              </a:ext>
-            </a:extLst>
-          </p:cNvPr>
-          <p:cNvCxnSpPr>
-            <a:cxnSpLocks/>
-          </p:cNvCxnSpPr>
-          <p:nvPr/>
-        </p:nvCxnSpPr>
-        <p:spPr>
-          <a:xfrm>
-            <a:off x="7845381" y="4427333"/>
-            <a:ext cx="279041" cy="0"/>
-          </a:xfrm>
-          <a:prstGeom prst="straightConnector1">
-            <a:avLst/>
-          </a:prstGeom>
-          <a:ln>
-            <a:solidFill>
-              <a:schemeClr val="tx1"/>
-            </a:solidFill>
-            <a:tailEnd type="triangle"/>
-          </a:ln>
-        </p:spPr>
-        <p:style>
-          <a:lnRef idx="2">
-            <a:schemeClr val="accent1"/>
-          </a:lnRef>
-          <a:fillRef idx="0">
-            <a:schemeClr val="accent1"/>
-          </a:fillRef>
-          <a:effectRef idx="1">
-            <a:schemeClr val="accent1"/>
-          </a:effectRef>
-          <a:fontRef idx="minor">
-            <a:schemeClr val="tx1"/>
-          </a:fontRef>
-        </p:style>
-      </p:cxnSp>
-      <p:cxnSp>
-        <p:nvCxnSpPr>
-          <p:cNvPr id="35" name="Straight Arrow Connector 34">
-            <a:extLst>
-              <a:ext uri="{FF2B5EF4-FFF2-40B4-BE49-F238E27FC236}">
-                <a16:creationId xmlns:a16="http://schemas.microsoft.com/office/drawing/2014/main" id="{12762B5D-3831-C880-1213-73BC60FDB2F9}"/>
-              </a:ext>
-            </a:extLst>
-          </p:cNvPr>
-          <p:cNvCxnSpPr>
-            <a:cxnSpLocks/>
-          </p:cNvCxnSpPr>
-          <p:nvPr/>
-        </p:nvCxnSpPr>
-        <p:spPr>
-          <a:xfrm>
-            <a:off x="9783652" y="4420895"/>
-            <a:ext cx="279041" cy="0"/>
-          </a:xfrm>
-          <a:prstGeom prst="straightConnector1">
-            <a:avLst/>
-          </a:prstGeom>
-          <a:ln>
-            <a:solidFill>
-              <a:schemeClr val="tx1"/>
-            </a:solidFill>
-            <a:tailEnd type="triangle"/>
-          </a:ln>
-        </p:spPr>
-        <p:style>
-          <a:lnRef idx="2">
-            <a:schemeClr val="accent1"/>
-          </a:lnRef>
-          <a:fillRef idx="0">
-            <a:schemeClr val="accent1"/>
-          </a:fillRef>
-          <a:effectRef idx="1">
-            <a:schemeClr val="accent1"/>
-          </a:effectRef>
-          <a:fontRef idx="minor">
-            <a:schemeClr val="tx1"/>
-          </a:fontRef>
-        </p:style>
-      </p:cxnSp>
     </p:spTree>
     <p:extLst>
       <p:ext uri="{BB962C8B-B14F-4D97-AF65-F5344CB8AC3E}">
-        <p14:creationId xmlns:p14="http://schemas.microsoft.com/office/powerpoint/2010/main" val="3893877902"/>
+        <p14:creationId xmlns:p14="http://schemas.microsoft.com/office/powerpoint/2010/main" val="4210638896"/>
       </p:ext>
     </p:extLst>
   </p:cSld>
@@ -4610,10 +4238,10 @@
       </p:grpSpPr>
       <p:sp>
         <p:nvSpPr>
-          <p:cNvPr id="5" name="TextBox 4">
-            <a:extLst>
-              <a:ext uri="{FF2B5EF4-FFF2-40B4-BE49-F238E27FC236}">
-                <a16:creationId xmlns:a16="http://schemas.microsoft.com/office/drawing/2014/main" id="{FA641203-4A44-B20B-9CCC-7A9D9A8EE539}"/>
+          <p:cNvPr id="4" name="TextBox 3">
+            <a:extLst>
+              <a:ext uri="{FF2B5EF4-FFF2-40B4-BE49-F238E27FC236}">
+                <a16:creationId xmlns:a16="http://schemas.microsoft.com/office/drawing/2014/main" id="{F4918419-8C69-5315-83DA-63D71BBACE8B}"/>
               </a:ext>
             </a:extLst>
           </p:cNvPr>
@@ -4622,170 +4250,8 @@
         </p:nvSpPr>
         <p:spPr>
           <a:xfrm>
-            <a:off x="375364" y="631290"/>
-            <a:ext cx="11080659" cy="4430957"/>
-          </a:xfrm>
-          <a:prstGeom prst="rect">
-            <a:avLst/>
-          </a:prstGeom>
-          <a:noFill/>
-        </p:spPr>
-        <p:txBody>
-          <a:bodyPr wrap="square">
-            <a:spAutoFit/>
-          </a:bodyPr>
-          <a:lstStyle/>
-          <a:p>
-            <a:pPr lvl="0" algn="just">
-              <a:lnSpc>
-                <a:spcPct val="150000"/>
-              </a:lnSpc>
-              <a:spcAft>
-                <a:spcPts val="800"/>
-              </a:spcAft>
-            </a:pPr>
-            <a:endParaRPr lang="en-AU" sz="2000" kern="100" dirty="0">
-              <a:solidFill>
-                <a:prstClr val="black"/>
-              </a:solidFill>
-              <a:latin typeface="Times New Roman" panose="02020603050405020304" pitchFamily="18" charset="0"/>
-              <a:cs typeface="Times New Roman" panose="02020603050405020304" pitchFamily="18" charset="0"/>
-            </a:endParaRPr>
-          </a:p>
-          <a:p>
-            <a:pPr marL="342900" lvl="0" indent="-342900" algn="just">
-              <a:lnSpc>
-                <a:spcPct val="250000"/>
-              </a:lnSpc>
-              <a:spcAft>
-                <a:spcPts val="800"/>
-              </a:spcAft>
-              <a:buFont typeface="Symbol" panose="05050102010706020507" pitchFamily="18" charset="2"/>
-              <a:buChar char=""/>
-            </a:pPr>
-            <a:r>
-              <a:rPr lang="en-AU" sz="2000" kern="100" dirty="0">
-                <a:solidFill>
-                  <a:prstClr val="black"/>
-                </a:solidFill>
-                <a:latin typeface="Times New Roman" panose="02020603050405020304" pitchFamily="18" charset="0"/>
-                <a:cs typeface="Times New Roman" panose="02020603050405020304" pitchFamily="18" charset="0"/>
-              </a:rPr>
-              <a:t>Sequential trees focus on misclassified examples (helping minority classes).</a:t>
-            </a:r>
-          </a:p>
-          <a:p>
-            <a:pPr marL="342900" lvl="0" indent="-342900" algn="just">
-              <a:lnSpc>
-                <a:spcPct val="250000"/>
-              </a:lnSpc>
-              <a:spcAft>
-                <a:spcPts val="800"/>
-              </a:spcAft>
-              <a:buFont typeface="Symbol" panose="05050102010706020507" pitchFamily="18" charset="2"/>
-              <a:buChar char=""/>
-            </a:pPr>
-            <a:r>
-              <a:rPr lang="en-AU" sz="2000" kern="100" dirty="0">
-                <a:solidFill>
-                  <a:prstClr val="black"/>
-                </a:solidFill>
-                <a:latin typeface="Times New Roman" panose="02020603050405020304" pitchFamily="18" charset="0"/>
-                <a:cs typeface="Times New Roman" panose="02020603050405020304" pitchFamily="18" charset="0"/>
-              </a:rPr>
-              <a:t> Supports categorical features natively (</a:t>
-            </a:r>
-            <a:r>
-              <a:rPr lang="en-AU" sz="2000" kern="100" dirty="0" err="1">
-                <a:solidFill>
-                  <a:prstClr val="black"/>
-                </a:solidFill>
-                <a:latin typeface="Times New Roman" panose="02020603050405020304" pitchFamily="18" charset="0"/>
-                <a:cs typeface="Times New Roman" panose="02020603050405020304" pitchFamily="18" charset="0"/>
-              </a:rPr>
-              <a:t>XGBoost</a:t>
-            </a:r>
-            <a:r>
-              <a:rPr lang="en-AU" sz="2000" kern="100" dirty="0">
-                <a:solidFill>
-                  <a:prstClr val="black"/>
-                </a:solidFill>
-                <a:latin typeface="Times New Roman" panose="02020603050405020304" pitchFamily="18" charset="0"/>
-                <a:cs typeface="Times New Roman" panose="02020603050405020304" pitchFamily="18" charset="0"/>
-              </a:rPr>
-              <a:t> ≥ 1.5). </a:t>
-            </a:r>
-          </a:p>
-          <a:p>
-            <a:pPr marL="342900" lvl="0" indent="-342900" algn="just">
-              <a:lnSpc>
-                <a:spcPct val="250000"/>
-              </a:lnSpc>
-              <a:spcAft>
-                <a:spcPts val="800"/>
-              </a:spcAft>
-              <a:buFont typeface="Symbol" panose="05050102010706020507" pitchFamily="18" charset="2"/>
-              <a:buChar char=""/>
-            </a:pPr>
-            <a:r>
-              <a:rPr lang="en-AU" sz="2000" kern="100" dirty="0">
-                <a:solidFill>
-                  <a:prstClr val="black"/>
-                </a:solidFill>
-                <a:latin typeface="Times New Roman" panose="02020603050405020304" pitchFamily="18" charset="0"/>
-                <a:cs typeface="Times New Roman" panose="02020603050405020304" pitchFamily="18" charset="0"/>
-              </a:rPr>
-              <a:t>No need for numerical feature scaling. </a:t>
-            </a:r>
-          </a:p>
-          <a:p>
-            <a:pPr marL="342900" lvl="0" indent="-342900" algn="just">
-              <a:lnSpc>
-                <a:spcPct val="250000"/>
-              </a:lnSpc>
-              <a:spcAft>
-                <a:spcPts val="800"/>
-              </a:spcAft>
-              <a:buFont typeface="Symbol" panose="05050102010706020507" pitchFamily="18" charset="2"/>
-              <a:buChar char=""/>
-            </a:pPr>
-            <a:r>
-              <a:rPr lang="en-AU" sz="2000" kern="100" dirty="0">
-                <a:solidFill>
-                  <a:prstClr val="black"/>
-                </a:solidFill>
-                <a:latin typeface="Times New Roman" panose="02020603050405020304" pitchFamily="18" charset="0"/>
-                <a:cs typeface="Times New Roman" panose="02020603050405020304" pitchFamily="18" charset="0"/>
-              </a:rPr>
-              <a:t>Allows class weighting to further address imbalance.</a:t>
-            </a:r>
-          </a:p>
-          <a:p>
-            <a:pPr lvl="0" algn="just">
-              <a:lnSpc>
-                <a:spcPct val="107000"/>
-              </a:lnSpc>
-            </a:pPr>
-            <a:endParaRPr lang="en-AU" dirty="0"/>
-          </a:p>
-        </p:txBody>
-      </p:sp>
-      <p:sp>
-        <p:nvSpPr>
-          <p:cNvPr id="6" name="TextBox 5">
-            <a:extLst>
-              <a:ext uri="{FF2B5EF4-FFF2-40B4-BE49-F238E27FC236}">
-                <a16:creationId xmlns:a16="http://schemas.microsoft.com/office/drawing/2014/main" id="{0FB1C7E5-91AC-4F48-D4E3-FE2EE5C22634}"/>
-              </a:ext>
-            </a:extLst>
-          </p:cNvPr>
-          <p:cNvSpPr txBox="1"/>
-          <p:nvPr/>
-        </p:nvSpPr>
-        <p:spPr>
-          <a:xfrm>
-            <a:off x="375364" y="308734"/>
-            <a:ext cx="8884812" cy="645113"/>
+            <a:off x="397738" y="236801"/>
+            <a:ext cx="4666981" cy="660437"/>
           </a:xfrm>
           <a:prstGeom prst="rect">
             <a:avLst/>
@@ -4812,29 +4278,605 @@
                 <a:ea typeface="Aptos" panose="020B0004020202020204" pitchFamily="34" charset="0"/>
                 <a:cs typeface="Times New Roman" panose="02020603050405020304" pitchFamily="18" charset="0"/>
               </a:rPr>
-              <a:t>Why </a:t>
-            </a:r>
-            <a:r>
-              <a:rPr lang="en-AU" sz="3600" b="1" kern="100" dirty="0" err="1">
+              <a:t>Baseline model</a:t>
+            </a:r>
+            <a:endParaRPr lang="en-AU" sz="3600" kern="100" dirty="0">
+              <a:latin typeface="Aptos" panose="020B0004020202020204" pitchFamily="34" charset="0"/>
+              <a:ea typeface="Aptos" panose="020B0004020202020204" pitchFamily="34" charset="0"/>
+              <a:cs typeface="Times New Roman" panose="02020603050405020304" pitchFamily="18" charset="0"/>
+            </a:endParaRPr>
+          </a:p>
+        </p:txBody>
+      </p:sp>
+      <p:sp>
+        <p:nvSpPr>
+          <p:cNvPr id="10" name="TextBox 9">
+            <a:extLst>
+              <a:ext uri="{FF2B5EF4-FFF2-40B4-BE49-F238E27FC236}">
+                <a16:creationId xmlns:a16="http://schemas.microsoft.com/office/drawing/2014/main" id="{9709729B-5093-893A-9A02-A98009DF7558}"/>
+              </a:ext>
+            </a:extLst>
+          </p:cNvPr>
+          <p:cNvSpPr txBox="1"/>
+          <p:nvPr/>
+        </p:nvSpPr>
+        <p:spPr>
+          <a:xfrm>
+            <a:off x="2338155" y="2782670"/>
+            <a:ext cx="1555995" cy="646331"/>
+          </a:xfrm>
+          <a:prstGeom prst="rect">
+            <a:avLst/>
+          </a:prstGeom>
+          <a:noFill/>
+          <a:ln w="25400">
+            <a:solidFill>
+              <a:schemeClr val="accent1">
+                <a:shade val="15000"/>
+              </a:schemeClr>
+            </a:solidFill>
+          </a:ln>
+        </p:spPr>
+        <p:txBody>
+          <a:bodyPr wrap="square" rtlCol="0">
+            <a:spAutoFit/>
+          </a:bodyPr>
+          <a:lstStyle/>
+          <a:p>
+            <a:pPr algn="ctr"/>
+            <a:r>
+              <a:rPr lang="en-AU" dirty="0">
+                <a:latin typeface="Times New Roman" panose="02020603050405020304" pitchFamily="18" charset="0"/>
+                <a:cs typeface="Times New Roman" panose="02020603050405020304" pitchFamily="18" charset="0"/>
+              </a:rPr>
+              <a:t>Labelled data</a:t>
+            </a:r>
+          </a:p>
+          <a:p>
+            <a:pPr algn="ctr"/>
+            <a:endParaRPr lang="en-AU" dirty="0"/>
+          </a:p>
+        </p:txBody>
+      </p:sp>
+      <p:sp>
+        <p:nvSpPr>
+          <p:cNvPr id="14" name="TextBox 13">
+            <a:extLst>
+              <a:ext uri="{FF2B5EF4-FFF2-40B4-BE49-F238E27FC236}">
+                <a16:creationId xmlns:a16="http://schemas.microsoft.com/office/drawing/2014/main" id="{8B3F216B-C978-CC52-0843-19C489D85697}"/>
+              </a:ext>
+            </a:extLst>
+          </p:cNvPr>
+          <p:cNvSpPr txBox="1"/>
+          <p:nvPr/>
+        </p:nvSpPr>
+        <p:spPr>
+          <a:xfrm>
+            <a:off x="397738" y="2782674"/>
+            <a:ext cx="1555995" cy="646331"/>
+          </a:xfrm>
+          <a:prstGeom prst="rect">
+            <a:avLst/>
+          </a:prstGeom>
+          <a:noFill/>
+          <a:ln w="25400">
+            <a:solidFill>
+              <a:schemeClr val="accent1">
+                <a:shade val="15000"/>
+              </a:schemeClr>
+            </a:solidFill>
+          </a:ln>
+        </p:spPr>
+        <p:txBody>
+          <a:bodyPr wrap="square" rtlCol="0">
+            <a:spAutoFit/>
+          </a:bodyPr>
+          <a:lstStyle/>
+          <a:p>
+            <a:pPr algn="ctr"/>
+            <a:r>
+              <a:rPr lang="en-AU" dirty="0">
+                <a:latin typeface="Times New Roman" panose="02020603050405020304" pitchFamily="18" charset="0"/>
+                <a:cs typeface="Times New Roman" panose="02020603050405020304" pitchFamily="18" charset="0"/>
+              </a:rPr>
+              <a:t>Data preprocessing </a:t>
+            </a:r>
+            <a:endParaRPr lang="en-AU" dirty="0"/>
+          </a:p>
+        </p:txBody>
+      </p:sp>
+      <p:sp>
+        <p:nvSpPr>
+          <p:cNvPr id="15" name="TextBox 14">
+            <a:extLst>
+              <a:ext uri="{FF2B5EF4-FFF2-40B4-BE49-F238E27FC236}">
+                <a16:creationId xmlns:a16="http://schemas.microsoft.com/office/drawing/2014/main" id="{5EEACE14-D276-3E56-44DF-367597C138F6}"/>
+              </a:ext>
+            </a:extLst>
+          </p:cNvPr>
+          <p:cNvSpPr txBox="1"/>
+          <p:nvPr/>
+        </p:nvSpPr>
+        <p:spPr>
+          <a:xfrm>
+            <a:off x="4278572" y="2787886"/>
+            <a:ext cx="1555995" cy="646331"/>
+          </a:xfrm>
+          <a:prstGeom prst="rect">
+            <a:avLst/>
+          </a:prstGeom>
+          <a:noFill/>
+          <a:ln w="25400">
+            <a:solidFill>
+              <a:schemeClr val="accent1">
+                <a:shade val="15000"/>
+              </a:schemeClr>
+            </a:solidFill>
+          </a:ln>
+        </p:spPr>
+        <p:txBody>
+          <a:bodyPr wrap="square" rtlCol="0">
+            <a:spAutoFit/>
+          </a:bodyPr>
+          <a:lstStyle/>
+          <a:p>
+            <a:pPr algn="ctr"/>
+            <a:r>
+              <a:rPr lang="en-AU" dirty="0">
+                <a:latin typeface="Times New Roman" panose="02020603050405020304" pitchFamily="18" charset="0"/>
+                <a:cs typeface="Times New Roman" panose="02020603050405020304" pitchFamily="18" charset="0"/>
+              </a:rPr>
+              <a:t>Training</a:t>
+            </a:r>
+          </a:p>
+          <a:p>
+            <a:pPr algn="ctr"/>
+            <a:endParaRPr lang="en-AU" dirty="0"/>
+          </a:p>
+        </p:txBody>
+      </p:sp>
+      <p:sp>
+        <p:nvSpPr>
+          <p:cNvPr id="16" name="TextBox 15">
+            <a:extLst>
+              <a:ext uri="{FF2B5EF4-FFF2-40B4-BE49-F238E27FC236}">
+                <a16:creationId xmlns:a16="http://schemas.microsoft.com/office/drawing/2014/main" id="{9A00B939-426F-0F06-D421-26C1190B6F6B}"/>
+              </a:ext>
+            </a:extLst>
+          </p:cNvPr>
+          <p:cNvSpPr txBox="1"/>
+          <p:nvPr/>
+        </p:nvSpPr>
+        <p:spPr>
+          <a:xfrm>
+            <a:off x="6218989" y="2794324"/>
+            <a:ext cx="1555995" cy="569387"/>
+          </a:xfrm>
+          <a:prstGeom prst="rect">
+            <a:avLst/>
+          </a:prstGeom>
+          <a:noFill/>
+          <a:ln w="25400">
+            <a:solidFill>
+              <a:schemeClr val="accent1">
+                <a:shade val="15000"/>
+              </a:schemeClr>
+            </a:solidFill>
+          </a:ln>
+        </p:spPr>
+        <p:txBody>
+          <a:bodyPr wrap="square" rtlCol="0">
+            <a:spAutoFit/>
+          </a:bodyPr>
+          <a:lstStyle/>
+          <a:p>
+            <a:pPr algn="ctr"/>
+            <a:r>
+              <a:rPr lang="en-AU" sz="1550" dirty="0">
+                <a:latin typeface="Times New Roman" panose="02020603050405020304" pitchFamily="18" charset="0"/>
+                <a:cs typeface="Times New Roman" panose="02020603050405020304" pitchFamily="18" charset="0"/>
+              </a:rPr>
+              <a:t>Validation on the validation set</a:t>
+            </a:r>
+          </a:p>
+        </p:txBody>
+      </p:sp>
+      <p:sp>
+        <p:nvSpPr>
+          <p:cNvPr id="17" name="TextBox 16">
+            <a:extLst>
+              <a:ext uri="{FF2B5EF4-FFF2-40B4-BE49-F238E27FC236}">
+                <a16:creationId xmlns:a16="http://schemas.microsoft.com/office/drawing/2014/main" id="{A0C4BF67-AECA-EF9A-26F5-B84EDCBC5B6D}"/>
+              </a:ext>
+            </a:extLst>
+          </p:cNvPr>
+          <p:cNvSpPr txBox="1"/>
+          <p:nvPr/>
+        </p:nvSpPr>
+        <p:spPr>
+          <a:xfrm>
+            <a:off x="8159406" y="2794324"/>
+            <a:ext cx="1555995" cy="646331"/>
+          </a:xfrm>
+          <a:prstGeom prst="rect">
+            <a:avLst/>
+          </a:prstGeom>
+          <a:noFill/>
+          <a:ln w="25400">
+            <a:solidFill>
+              <a:schemeClr val="accent1">
+                <a:shade val="15000"/>
+              </a:schemeClr>
+            </a:solidFill>
+          </a:ln>
+        </p:spPr>
+        <p:txBody>
+          <a:bodyPr wrap="square" rtlCol="0">
+            <a:spAutoFit/>
+          </a:bodyPr>
+          <a:lstStyle/>
+          <a:p>
+            <a:pPr algn="ctr"/>
+            <a:r>
+              <a:rPr lang="en-AU" dirty="0">
+                <a:latin typeface="Times New Roman" panose="02020603050405020304" pitchFamily="18" charset="0"/>
+                <a:cs typeface="Times New Roman" panose="02020603050405020304" pitchFamily="18" charset="0"/>
+              </a:rPr>
+              <a:t>Validation on the test set</a:t>
+            </a:r>
+          </a:p>
+        </p:txBody>
+      </p:sp>
+      <p:sp>
+        <p:nvSpPr>
+          <p:cNvPr id="23" name="TextBox 22">
+            <a:extLst>
+              <a:ext uri="{FF2B5EF4-FFF2-40B4-BE49-F238E27FC236}">
+                <a16:creationId xmlns:a16="http://schemas.microsoft.com/office/drawing/2014/main" id="{9A4D887B-FB56-B694-D2E8-5B9DC9D44A2B}"/>
+              </a:ext>
+            </a:extLst>
+          </p:cNvPr>
+          <p:cNvSpPr txBox="1"/>
+          <p:nvPr/>
+        </p:nvSpPr>
+        <p:spPr>
+          <a:xfrm>
+            <a:off x="10099823" y="2782669"/>
+            <a:ext cx="1555995" cy="646331"/>
+          </a:xfrm>
+          <a:prstGeom prst="rect">
+            <a:avLst/>
+          </a:prstGeom>
+          <a:noFill/>
+          <a:ln w="25400">
+            <a:solidFill>
+              <a:schemeClr val="accent1">
+                <a:shade val="15000"/>
+              </a:schemeClr>
+            </a:solidFill>
+          </a:ln>
+        </p:spPr>
+        <p:txBody>
+          <a:bodyPr wrap="square" rtlCol="0">
+            <a:spAutoFit/>
+          </a:bodyPr>
+          <a:lstStyle/>
+          <a:p>
+            <a:pPr algn="ctr"/>
+            <a:r>
+              <a:rPr lang="en-AU" dirty="0">
+                <a:latin typeface="Times New Roman" panose="02020603050405020304" pitchFamily="18" charset="0"/>
+                <a:cs typeface="Times New Roman" panose="02020603050405020304" pitchFamily="18" charset="0"/>
+              </a:rPr>
+              <a:t>Save the model</a:t>
+            </a:r>
+          </a:p>
+        </p:txBody>
+      </p:sp>
+      <p:sp>
+        <p:nvSpPr>
+          <p:cNvPr id="25" name="TextBox 24">
+            <a:extLst>
+              <a:ext uri="{FF2B5EF4-FFF2-40B4-BE49-F238E27FC236}">
+                <a16:creationId xmlns:a16="http://schemas.microsoft.com/office/drawing/2014/main" id="{189411FD-672D-0CD2-9E41-61F21DCF2FCE}"/>
+              </a:ext>
+            </a:extLst>
+          </p:cNvPr>
+          <p:cNvSpPr txBox="1"/>
+          <p:nvPr/>
+        </p:nvSpPr>
+        <p:spPr>
+          <a:xfrm>
+            <a:off x="2308002" y="3538553"/>
+            <a:ext cx="1616299" cy="523220"/>
+          </a:xfrm>
+          <a:prstGeom prst="rect">
+            <a:avLst/>
+          </a:prstGeom>
+          <a:noFill/>
+        </p:spPr>
+        <p:txBody>
+          <a:bodyPr wrap="square">
+            <a:spAutoFit/>
+          </a:bodyPr>
+          <a:lstStyle/>
+          <a:p>
+            <a:r>
+              <a:rPr lang="en-AU" sz="1400" dirty="0">
+                <a:latin typeface="Times New Roman" panose="02020603050405020304" pitchFamily="18" charset="0"/>
+                <a:cs typeface="Times New Roman" panose="02020603050405020304" pitchFamily="18" charset="0"/>
+              </a:rPr>
+              <a:t>train/validation/test = 70/10/20</a:t>
+            </a:r>
+          </a:p>
+        </p:txBody>
+      </p:sp>
+      <p:sp>
+        <p:nvSpPr>
+          <p:cNvPr id="26" name="TextBox 25">
+            <a:extLst>
+              <a:ext uri="{FF2B5EF4-FFF2-40B4-BE49-F238E27FC236}">
+                <a16:creationId xmlns:a16="http://schemas.microsoft.com/office/drawing/2014/main" id="{00B6F944-88E3-3B8A-6334-DBA079C06E86}"/>
+              </a:ext>
+            </a:extLst>
+          </p:cNvPr>
+          <p:cNvSpPr txBox="1"/>
+          <p:nvPr/>
+        </p:nvSpPr>
+        <p:spPr>
+          <a:xfrm>
+            <a:off x="4473699" y="3538553"/>
+            <a:ext cx="1360868" cy="307777"/>
+          </a:xfrm>
+          <a:prstGeom prst="rect">
+            <a:avLst/>
+          </a:prstGeom>
+          <a:noFill/>
+        </p:spPr>
+        <p:txBody>
+          <a:bodyPr wrap="square">
+            <a:spAutoFit/>
+          </a:bodyPr>
+          <a:lstStyle/>
+          <a:p>
+            <a:r>
+              <a:rPr lang="en-AU" sz="1400" dirty="0" err="1">
                 <a:latin typeface="Times New Roman" panose="02020603050405020304" pitchFamily="18" charset="0"/>
                 <a:cs typeface="Times New Roman" panose="02020603050405020304" pitchFamily="18" charset="0"/>
               </a:rPr>
               <a:t>XGBClassifier</a:t>
             </a:r>
-            <a:r>
-              <a:rPr lang="en-AU" sz="3600" b="1" kern="100" dirty="0">
-                <a:latin typeface="Times New Roman" panose="02020603050405020304" pitchFamily="18" charset="0"/>
-                <a:cs typeface="Times New Roman" panose="02020603050405020304" pitchFamily="18" charset="0"/>
-              </a:rPr>
-              <a:t>?</a:t>
-            </a:r>
+            <a:endParaRPr lang="en-AU" sz="1400" dirty="0">
+              <a:latin typeface="Times New Roman" panose="02020603050405020304" pitchFamily="18" charset="0"/>
+              <a:cs typeface="Times New Roman" panose="02020603050405020304" pitchFamily="18" charset="0"/>
+            </a:endParaRPr>
           </a:p>
         </p:txBody>
       </p:sp>
+      <p:cxnSp>
+        <p:nvCxnSpPr>
+          <p:cNvPr id="28" name="Straight Arrow Connector 27">
+            <a:extLst>
+              <a:ext uri="{FF2B5EF4-FFF2-40B4-BE49-F238E27FC236}">
+                <a16:creationId xmlns:a16="http://schemas.microsoft.com/office/drawing/2014/main" id="{E10267CE-E720-B7A4-3D6A-F505204AA98F}"/>
+              </a:ext>
+            </a:extLst>
+          </p:cNvPr>
+          <p:cNvCxnSpPr>
+            <a:cxnSpLocks/>
+          </p:cNvCxnSpPr>
+          <p:nvPr/>
+        </p:nvCxnSpPr>
+        <p:spPr>
+          <a:xfrm>
+            <a:off x="1998809" y="3111454"/>
+            <a:ext cx="279041" cy="0"/>
+          </a:xfrm>
+          <a:prstGeom prst="straightConnector1">
+            <a:avLst/>
+          </a:prstGeom>
+          <a:ln>
+            <a:solidFill>
+              <a:schemeClr val="tx1"/>
+            </a:solidFill>
+            <a:tailEnd type="triangle"/>
+          </a:ln>
+        </p:spPr>
+        <p:style>
+          <a:lnRef idx="2">
+            <a:schemeClr val="accent1"/>
+          </a:lnRef>
+          <a:fillRef idx="0">
+            <a:schemeClr val="accent1"/>
+          </a:fillRef>
+          <a:effectRef idx="1">
+            <a:schemeClr val="accent1"/>
+          </a:effectRef>
+          <a:fontRef idx="minor">
+            <a:schemeClr val="tx1"/>
+          </a:fontRef>
+        </p:style>
+      </p:cxnSp>
+      <p:cxnSp>
+        <p:nvCxnSpPr>
+          <p:cNvPr id="32" name="Straight Arrow Connector 31">
+            <a:extLst>
+              <a:ext uri="{FF2B5EF4-FFF2-40B4-BE49-F238E27FC236}">
+                <a16:creationId xmlns:a16="http://schemas.microsoft.com/office/drawing/2014/main" id="{0C19A10D-4DE5-6A99-472E-958DAA36608F}"/>
+              </a:ext>
+            </a:extLst>
+          </p:cNvPr>
+          <p:cNvCxnSpPr>
+            <a:cxnSpLocks/>
+          </p:cNvCxnSpPr>
+          <p:nvPr/>
+        </p:nvCxnSpPr>
+        <p:spPr>
+          <a:xfrm>
+            <a:off x="3960691" y="3115747"/>
+            <a:ext cx="279041" cy="0"/>
+          </a:xfrm>
+          <a:prstGeom prst="straightConnector1">
+            <a:avLst/>
+          </a:prstGeom>
+          <a:ln>
+            <a:solidFill>
+              <a:schemeClr val="tx1"/>
+            </a:solidFill>
+            <a:tailEnd type="triangle"/>
+          </a:ln>
+        </p:spPr>
+        <p:style>
+          <a:lnRef idx="2">
+            <a:schemeClr val="accent1"/>
+          </a:lnRef>
+          <a:fillRef idx="0">
+            <a:schemeClr val="accent1"/>
+          </a:fillRef>
+          <a:effectRef idx="1">
+            <a:schemeClr val="accent1"/>
+          </a:effectRef>
+          <a:fontRef idx="minor">
+            <a:schemeClr val="tx1"/>
+          </a:fontRef>
+        </p:style>
+      </p:cxnSp>
+      <p:cxnSp>
+        <p:nvCxnSpPr>
+          <p:cNvPr id="33" name="Straight Arrow Connector 32">
+            <a:extLst>
+              <a:ext uri="{FF2B5EF4-FFF2-40B4-BE49-F238E27FC236}">
+                <a16:creationId xmlns:a16="http://schemas.microsoft.com/office/drawing/2014/main" id="{CB9C7B51-514A-007E-BB8C-7D2915E7FE36}"/>
+              </a:ext>
+            </a:extLst>
+          </p:cNvPr>
+          <p:cNvCxnSpPr>
+            <a:cxnSpLocks/>
+          </p:cNvCxnSpPr>
+          <p:nvPr/>
+        </p:nvCxnSpPr>
+        <p:spPr>
+          <a:xfrm>
+            <a:off x="5898961" y="3109307"/>
+            <a:ext cx="279041" cy="0"/>
+          </a:xfrm>
+          <a:prstGeom prst="straightConnector1">
+            <a:avLst/>
+          </a:prstGeom>
+          <a:ln>
+            <a:solidFill>
+              <a:schemeClr val="tx1"/>
+            </a:solidFill>
+            <a:tailEnd type="triangle"/>
+          </a:ln>
+        </p:spPr>
+        <p:style>
+          <a:lnRef idx="2">
+            <a:schemeClr val="accent1"/>
+          </a:lnRef>
+          <a:fillRef idx="0">
+            <a:schemeClr val="accent1"/>
+          </a:fillRef>
+          <a:effectRef idx="1">
+            <a:schemeClr val="accent1"/>
+          </a:effectRef>
+          <a:fontRef idx="minor">
+            <a:schemeClr val="tx1"/>
+          </a:fontRef>
+        </p:style>
+      </p:cxnSp>
+      <p:cxnSp>
+        <p:nvCxnSpPr>
+          <p:cNvPr id="34" name="Straight Arrow Connector 33">
+            <a:extLst>
+              <a:ext uri="{FF2B5EF4-FFF2-40B4-BE49-F238E27FC236}">
+                <a16:creationId xmlns:a16="http://schemas.microsoft.com/office/drawing/2014/main" id="{651A76DF-19C6-433D-B42A-16584469E319}"/>
+              </a:ext>
+            </a:extLst>
+          </p:cNvPr>
+          <p:cNvCxnSpPr>
+            <a:cxnSpLocks/>
+          </p:cNvCxnSpPr>
+          <p:nvPr/>
+        </p:nvCxnSpPr>
+        <p:spPr>
+          <a:xfrm>
+            <a:off x="7837231" y="3109307"/>
+            <a:ext cx="279041" cy="0"/>
+          </a:xfrm>
+          <a:prstGeom prst="straightConnector1">
+            <a:avLst/>
+          </a:prstGeom>
+          <a:ln>
+            <a:solidFill>
+              <a:schemeClr val="tx1"/>
+            </a:solidFill>
+            <a:tailEnd type="triangle"/>
+          </a:ln>
+        </p:spPr>
+        <p:style>
+          <a:lnRef idx="2">
+            <a:schemeClr val="accent1"/>
+          </a:lnRef>
+          <a:fillRef idx="0">
+            <a:schemeClr val="accent1"/>
+          </a:fillRef>
+          <a:effectRef idx="1">
+            <a:schemeClr val="accent1"/>
+          </a:effectRef>
+          <a:fontRef idx="minor">
+            <a:schemeClr val="tx1"/>
+          </a:fontRef>
+        </p:style>
+      </p:cxnSp>
+      <p:cxnSp>
+        <p:nvCxnSpPr>
+          <p:cNvPr id="35" name="Straight Arrow Connector 34">
+            <a:extLst>
+              <a:ext uri="{FF2B5EF4-FFF2-40B4-BE49-F238E27FC236}">
+                <a16:creationId xmlns:a16="http://schemas.microsoft.com/office/drawing/2014/main" id="{12762B5D-3831-C880-1213-73BC60FDB2F9}"/>
+              </a:ext>
+            </a:extLst>
+          </p:cNvPr>
+          <p:cNvCxnSpPr>
+            <a:cxnSpLocks/>
+          </p:cNvCxnSpPr>
+          <p:nvPr/>
+        </p:nvCxnSpPr>
+        <p:spPr>
+          <a:xfrm>
+            <a:off x="9775502" y="3102869"/>
+            <a:ext cx="279041" cy="0"/>
+          </a:xfrm>
+          <a:prstGeom prst="straightConnector1">
+            <a:avLst/>
+          </a:prstGeom>
+          <a:ln>
+            <a:solidFill>
+              <a:schemeClr val="tx1"/>
+            </a:solidFill>
+            <a:tailEnd type="triangle"/>
+          </a:ln>
+        </p:spPr>
+        <p:style>
+          <a:lnRef idx="2">
+            <a:schemeClr val="accent1"/>
+          </a:lnRef>
+          <a:fillRef idx="0">
+            <a:schemeClr val="accent1"/>
+          </a:fillRef>
+          <a:effectRef idx="1">
+            <a:schemeClr val="accent1"/>
+          </a:effectRef>
+          <a:fontRef idx="minor">
+            <a:schemeClr val="tx1"/>
+          </a:fontRef>
+        </p:style>
+      </p:cxnSp>
     </p:spTree>
     <p:extLst>
       <p:ext uri="{BB962C8B-B14F-4D97-AF65-F5344CB8AC3E}">
-        <p14:creationId xmlns:p14="http://schemas.microsoft.com/office/powerpoint/2010/main" val="4210638896"/>
+        <p14:creationId xmlns:p14="http://schemas.microsoft.com/office/powerpoint/2010/main" val="3893877902"/>
       </p:ext>
     </p:extLst>
   </p:cSld>
@@ -4921,7 +4963,7 @@
                 <a:ea typeface="Aptos" panose="020B0004020202020204" pitchFamily="34" charset="0"/>
                 <a:cs typeface="Times New Roman" panose="02020603050405020304" pitchFamily="18" charset="0"/>
               </a:rPr>
-              <a:t>Simple model results</a:t>
+              <a:t>Baseline model results</a:t>
             </a:r>
             <a:endParaRPr kumimoji="0" lang="en-AU" sz="3600" b="0" i="0" u="none" strike="noStrike" kern="100" cap="none" spc="0" normalizeH="0" baseline="0" noProof="0" dirty="0">
               <a:ln>
@@ -5200,10 +5242,10 @@
       </p:sp>
       <p:sp>
         <p:nvSpPr>
-          <p:cNvPr id="2" name="TextBox 1">
-            <a:extLst>
-              <a:ext uri="{FF2B5EF4-FFF2-40B4-BE49-F238E27FC236}">
-                <a16:creationId xmlns:a16="http://schemas.microsoft.com/office/drawing/2014/main" id="{F8EF0531-4D79-5CD5-3D1B-49952CA37A18}"/>
+          <p:cNvPr id="3" name="TextBox 2">
+            <a:extLst>
+              <a:ext uri="{FF2B5EF4-FFF2-40B4-BE49-F238E27FC236}">
+                <a16:creationId xmlns:a16="http://schemas.microsoft.com/office/drawing/2014/main" id="{3F5273DB-7D2C-27DC-A8ED-265B61A9ABF2}"/>
               </a:ext>
             </a:extLst>
           </p:cNvPr>
@@ -5212,56 +5254,7 @@
         </p:nvSpPr>
         <p:spPr>
           <a:xfrm>
-            <a:off x="426613" y="332460"/>
-            <a:ext cx="9824970" cy="645113"/>
-          </a:xfrm>
-          <a:prstGeom prst="rect">
-            <a:avLst/>
-          </a:prstGeom>
-          <a:noFill/>
-        </p:spPr>
-        <p:txBody>
-          <a:bodyPr wrap="square">
-            <a:spAutoFit/>
-          </a:bodyPr>
-          <a:lstStyle/>
-          <a:p>
-            <a:pPr>
-              <a:lnSpc>
-                <a:spcPct val="107000"/>
-              </a:lnSpc>
-              <a:spcAft>
-                <a:spcPts val="800"/>
-              </a:spcAft>
-            </a:pPr>
-            <a:r>
-              <a:rPr lang="en-AU" sz="3600" b="1" kern="100" dirty="0">
-                <a:solidFill>
-                  <a:prstClr val="black"/>
-                </a:solidFill>
-                <a:latin typeface="Times New Roman" panose="02020603050405020304" pitchFamily="18" charset="0"/>
-                <a:cs typeface="Times New Roman" panose="02020603050405020304" pitchFamily="18" charset="0"/>
-              </a:rPr>
-              <a:t>What else would you do if you had more time?</a:t>
-            </a:r>
-          </a:p>
-        </p:txBody>
-      </p:sp>
-      <p:sp>
-        <p:nvSpPr>
-          <p:cNvPr id="3" name="TextBox 2">
-            <a:extLst>
-              <a:ext uri="{FF2B5EF4-FFF2-40B4-BE49-F238E27FC236}">
-                <a16:creationId xmlns:a16="http://schemas.microsoft.com/office/drawing/2014/main" id="{3F5273DB-7D2C-27DC-A8ED-265B61A9ABF2}"/>
-              </a:ext>
-            </a:extLst>
-          </p:cNvPr>
-          <p:cNvSpPr txBox="1"/>
-          <p:nvPr/>
-        </p:nvSpPr>
-        <p:spPr>
-          <a:xfrm>
-            <a:off x="426613" y="1227434"/>
+            <a:off x="309310" y="161533"/>
             <a:ext cx="5748807" cy="645113"/>
           </a:xfrm>
           <a:prstGeom prst="rect">
@@ -6507,8 +6500,8 @@
         </p:nvSpPr>
         <p:spPr>
           <a:xfrm>
-            <a:off x="426613" y="332460"/>
-            <a:ext cx="10629900" cy="660437"/>
+            <a:off x="427410" y="330775"/>
+            <a:ext cx="1756356" cy="660437"/>
           </a:xfrm>
           <a:prstGeom prst="rect">
             <a:avLst/>
@@ -6553,7 +6546,7 @@
                 <a:ea typeface="Aptos" panose="020B0004020202020204" pitchFamily="34" charset="0"/>
                 <a:cs typeface="Times New Roman" panose="02020603050405020304" pitchFamily="18" charset="0"/>
               </a:rPr>
-              <a:t>Semi-supervised model results and comparison</a:t>
+              <a:t>Results</a:t>
             </a:r>
             <a:endParaRPr kumimoji="0" lang="en-AU" sz="3600" b="0" i="0" u="none" strike="noStrike" kern="100" cap="none" spc="0" normalizeH="0" baseline="0" noProof="0" dirty="0">
               <a:ln>
@@ -6595,7 +6588,7 @@
         </p:blipFill>
         <p:spPr>
           <a:xfrm>
-            <a:off x="102755" y="1272559"/>
+            <a:off x="123822" y="1466242"/>
             <a:ext cx="4070002" cy="3215729"/>
           </a:xfrm>
           <a:prstGeom prst="rect">
@@ -6793,6 +6786,77 @@
                 <a:cs typeface="Times New Roman" panose="02020603050405020304" pitchFamily="18" charset="0"/>
               </a:rPr>
               <a:t>Overall accuracy has also improved. </a:t>
+            </a:r>
+          </a:p>
+        </p:txBody>
+      </p:sp>
+      <p:sp>
+        <p:nvSpPr>
+          <p:cNvPr id="3" name="TextBox 2">
+            <a:extLst>
+              <a:ext uri="{FF2B5EF4-FFF2-40B4-BE49-F238E27FC236}">
+                <a16:creationId xmlns:a16="http://schemas.microsoft.com/office/drawing/2014/main" id="{72E05A3A-5D74-FB34-5E5E-BD48C0DDD904}"/>
+              </a:ext>
+            </a:extLst>
+          </p:cNvPr>
+          <p:cNvSpPr txBox="1"/>
+          <p:nvPr/>
+        </p:nvSpPr>
+        <p:spPr>
+          <a:xfrm>
+            <a:off x="1386089" y="1087893"/>
+            <a:ext cx="1923781" cy="369332"/>
+          </a:xfrm>
+          <a:prstGeom prst="rect">
+            <a:avLst/>
+          </a:prstGeom>
+          <a:noFill/>
+        </p:spPr>
+        <p:txBody>
+          <a:bodyPr wrap="square">
+            <a:spAutoFit/>
+          </a:bodyPr>
+          <a:lstStyle/>
+          <a:p>
+            <a:r>
+              <a:rPr lang="en-AU" dirty="0"/>
+              <a:t>Baseline model</a:t>
+            </a:r>
+          </a:p>
+        </p:txBody>
+      </p:sp>
+      <p:sp>
+        <p:nvSpPr>
+          <p:cNvPr id="9" name="TextBox 8">
+            <a:extLst>
+              <a:ext uri="{FF2B5EF4-FFF2-40B4-BE49-F238E27FC236}">
+                <a16:creationId xmlns:a16="http://schemas.microsoft.com/office/drawing/2014/main" id="{A0116514-E73A-DFA8-7776-8F77B0F94A92}"/>
+              </a:ext>
+            </a:extLst>
+          </p:cNvPr>
+          <p:cNvSpPr txBox="1"/>
+          <p:nvPr/>
+        </p:nvSpPr>
+        <p:spPr>
+          <a:xfrm>
+            <a:off x="4956091" y="991213"/>
+            <a:ext cx="2653584" cy="369332"/>
+          </a:xfrm>
+          <a:prstGeom prst="rect">
+            <a:avLst/>
+          </a:prstGeom>
+          <a:noFill/>
+        </p:spPr>
+        <p:txBody>
+          <a:bodyPr wrap="square">
+            <a:spAutoFit/>
+          </a:bodyPr>
+          <a:lstStyle/>
+          <a:p>
+            <a:pPr algn="ctr"/>
+            <a:r>
+              <a:rPr lang="en-AU" dirty="0"/>
+              <a:t>Semi-supervised model</a:t>
             </a:r>
           </a:p>
         </p:txBody>
@@ -6891,7 +6955,7 @@
         <p:spPr>
           <a:xfrm>
             <a:off x="426613" y="1546946"/>
-            <a:ext cx="11080659" cy="3083986"/>
+            <a:ext cx="11080659" cy="2724913"/>
           </a:xfrm>
           <a:prstGeom prst="rect">
             <a:avLst/>
@@ -6923,47 +6987,6 @@
               </a:rPr>
               <a:t>Creating new categorical features with info about big sport events and age groups. </a:t>
             </a:r>
-            <a:r>
-              <a:rPr lang="en-AU" sz="2000" kern="100" dirty="0">
-                <a:latin typeface="Times New Roman" panose="02020603050405020304" pitchFamily="18" charset="0"/>
-                <a:ea typeface="Aptos" panose="020B0004020202020204" pitchFamily="34" charset="0"/>
-                <a:cs typeface="Times New Roman" panose="02020603050405020304" pitchFamily="18" charset="0"/>
-              </a:rPr>
-              <a:t>Some i</a:t>
-            </a:r>
-            <a:r>
-              <a:rPr lang="en-AU" sz="2000" kern="100" dirty="0">
-                <a:effectLst/>
-                <a:latin typeface="Times New Roman" panose="02020603050405020304" pitchFamily="18" charset="0"/>
-                <a:ea typeface="Aptos" panose="020B0004020202020204" pitchFamily="34" charset="0"/>
-                <a:cs typeface="Times New Roman" panose="02020603050405020304" pitchFamily="18" charset="0"/>
-              </a:rPr>
-              <a:t>nconsistent categorical entries (e.g., MOBILE vs Mobile, </a:t>
-            </a:r>
-            <a:r>
-              <a:rPr lang="en-AU" sz="2000" kern="100" dirty="0" err="1">
-                <a:effectLst/>
-                <a:latin typeface="Times New Roman" panose="02020603050405020304" pitchFamily="18" charset="0"/>
-                <a:ea typeface="Aptos" panose="020B0004020202020204" pitchFamily="34" charset="0"/>
-                <a:cs typeface="Times New Roman" panose="02020603050405020304" pitchFamily="18" charset="0"/>
-              </a:rPr>
-              <a:t>MobileAPP</a:t>
-            </a:r>
-            <a:r>
-              <a:rPr lang="en-AU" sz="2000" kern="100" dirty="0">
-                <a:effectLst/>
-                <a:latin typeface="Times New Roman" panose="02020603050405020304" pitchFamily="18" charset="0"/>
-                <a:ea typeface="Aptos" panose="020B0004020202020204" pitchFamily="34" charset="0"/>
-                <a:cs typeface="Times New Roman" panose="02020603050405020304" pitchFamily="18" charset="0"/>
-              </a:rPr>
-              <a:t> vs mobile, etc.).</a:t>
-            </a:r>
-            <a:endParaRPr lang="en-AU" sz="1800" kern="100" dirty="0">
-              <a:effectLst/>
-              <a:latin typeface="Aptos" panose="020B0004020202020204" pitchFamily="34" charset="0"/>
-              <a:ea typeface="Aptos" panose="020B0004020202020204" pitchFamily="34" charset="0"/>
-              <a:cs typeface="Times New Roman" panose="02020603050405020304" pitchFamily="18" charset="0"/>
-            </a:endParaRPr>
           </a:p>
           <a:p>
             <a:pPr marL="342900" lvl="0" indent="-342900" algn="just">
@@ -6978,12 +7001,47 @@
             </a:pPr>
             <a:r>
               <a:rPr lang="en-AU" sz="2000" kern="100" dirty="0">
+                <a:latin typeface="Times New Roman" panose="02020603050405020304" pitchFamily="18" charset="0"/>
+                <a:ea typeface="Aptos" panose="020B0004020202020204" pitchFamily="34" charset="0"/>
+                <a:cs typeface="Times New Roman" panose="02020603050405020304" pitchFamily="18" charset="0"/>
+              </a:rPr>
+              <a:t>Some i</a:t>
+            </a:r>
+            <a:r>
+              <a:rPr lang="en-AU" sz="2000" kern="100" dirty="0">
                 <a:effectLst/>
                 <a:latin typeface="Times New Roman" panose="02020603050405020304" pitchFamily="18" charset="0"/>
                 <a:ea typeface="Aptos" panose="020B0004020202020204" pitchFamily="34" charset="0"/>
                 <a:cs typeface="Times New Roman" panose="02020603050405020304" pitchFamily="18" charset="0"/>
               </a:rPr>
-              <a:t>Better handling of inconsistent categorical entries and negative </a:t>
+              <a:t>nconsistent categorical entries. Clarify on the data collection process.</a:t>
+            </a:r>
+            <a:endParaRPr lang="en-AU" sz="1800" kern="100" dirty="0">
+              <a:effectLst/>
+              <a:latin typeface="Aptos" panose="020B0004020202020204" pitchFamily="34" charset="0"/>
+              <a:ea typeface="Aptos" panose="020B0004020202020204" pitchFamily="34" charset="0"/>
+              <a:cs typeface="Times New Roman" panose="02020603050405020304" pitchFamily="18" charset="0"/>
+            </a:endParaRPr>
+          </a:p>
+          <a:p>
+            <a:pPr marL="342900" lvl="0" indent="-342900" algn="just">
+              <a:lnSpc>
+                <a:spcPct val="150000"/>
+              </a:lnSpc>
+              <a:spcAft>
+                <a:spcPts val="800"/>
+              </a:spcAft>
+              <a:buFont typeface="Symbol" panose="05050102010706020507" pitchFamily="18" charset="2"/>
+              <a:buChar char=""/>
+            </a:pPr>
+            <a:r>
+              <a:rPr lang="en-AU" sz="2000" kern="100" dirty="0">
+                <a:effectLst/>
+                <a:latin typeface="Times New Roman" panose="02020603050405020304" pitchFamily="18" charset="0"/>
+                <a:ea typeface="Aptos" panose="020B0004020202020204" pitchFamily="34" charset="0"/>
+                <a:cs typeface="Times New Roman" panose="02020603050405020304" pitchFamily="18" charset="0"/>
+              </a:rPr>
+              <a:t>Better handling of negative </a:t>
             </a:r>
             <a:r>
               <a:rPr lang="en-AU" sz="2000" kern="100" dirty="0" err="1">
@@ -7001,7 +7059,7 @@
                 <a:ea typeface="Aptos" panose="020B0004020202020204" pitchFamily="34" charset="0"/>
                 <a:cs typeface="Times New Roman" panose="02020603050405020304" pitchFamily="18" charset="0"/>
               </a:rPr>
-              <a:t> (clarification info is needed). </a:t>
+              <a:t>.</a:t>
             </a:r>
           </a:p>
           <a:p>

</xml_diff>